<commit_message>
Change for XMP spec ver. 1.3
</commit_message>
<xml_diff>
--- a/beginner/1.overview.pptx
+++ b/beginner/1.overview.pptx
@@ -243,7 +243,7 @@
           <a:p>
             <a:fld id="{A2FB5EE9-97AD-3041-8B83-8D35C734A7EA}" type="datetimeFigureOut">
               <a:rPr kumimoji="1" lang="ja-JP" altLang="en-US" smtClean="0"/>
-              <a:t>2015/12/18</a:t>
+              <a:t>2017/8/6</a:t>
             </a:fld>
             <a:endParaRPr kumimoji="1" lang="ja-JP" altLang="en-US"/>
           </a:p>
@@ -409,7 +409,7 @@
           <a:p>
             <a:fld id="{867424F6-89DB-4458-B281-074421B32A94}" type="datetimeFigureOut">
               <a:rPr kumimoji="1" lang="ja-JP" altLang="en-US" smtClean="0"/>
-              <a:t>2015/12/18</a:t>
+              <a:t>2017/8/6</a:t>
             </a:fld>
             <a:endParaRPr kumimoji="1" lang="ja-JP" altLang="en-US"/>
           </a:p>
@@ -9521,7 +9521,7 @@
                 <a:latin typeface="Consolas" pitchFamily="49" charset="0"/>
                 <a:cs typeface="Consolas" pitchFamily="49" charset="0"/>
               </a:rPr>
-              <a:t>] with t(</a:t>
+              <a:t>] with t[</a:t>
             </a:r>
             <a:r>
               <a:rPr lang="en-US" altLang="ja-JP" sz="2400" dirty="0" err="1" smtClean="0">
@@ -9531,11 +9531,11 @@
               <a:t>i</a:t>
             </a:r>
             <a:r>
-              <a:rPr lang="en-US" altLang="ja-JP" sz="2400" dirty="0" smtClean="0">
+              <a:rPr lang="en-US" altLang="ja-JP" sz="2400" dirty="0">
                 <a:latin typeface="Consolas" pitchFamily="49" charset="0"/>
                 <a:cs typeface="Consolas" pitchFamily="49" charset="0"/>
               </a:rPr>
-              <a:t>)</a:t>
+              <a:t>]</a:t>
             </a:r>
             <a:endParaRPr lang="ja-JP" altLang="en-US" sz="2400" dirty="0">
               <a:latin typeface="Consolas" pitchFamily="49" charset="0"/>
@@ -9748,105 +9748,6 @@
           </a:p>
         </p:txBody>
       </p:sp>
-      <p:sp>
-        <p:nvSpPr>
-          <p:cNvPr id="12" name="テキスト ボックス 11"/>
-          <p:cNvSpPr txBox="1"/>
-          <p:nvPr/>
-        </p:nvSpPr>
-        <p:spPr>
-          <a:xfrm>
-            <a:off x="2699792" y="5589240"/>
-            <a:ext cx="5668539" cy="369332"/>
-          </a:xfrm>
-          <a:prstGeom prst="rect">
-            <a:avLst/>
-          </a:prstGeom>
-          <a:noFill/>
-        </p:spPr>
-        <p:txBody>
-          <a:bodyPr wrap="none" rtlCol="0">
-            <a:spAutoFit/>
-          </a:bodyPr>
-          <a:lstStyle/>
-          <a:p>
-            <a:r>
-              <a:rPr kumimoji="1" lang="en-US" altLang="ja-JP" dirty="0" smtClean="0"/>
-              <a:t>※</a:t>
-            </a:r>
-            <a:r>
-              <a:rPr kumimoji="1" lang="ja-JP" altLang="en-US" dirty="0" smtClean="0"/>
-              <a:t> </a:t>
-            </a:r>
-            <a:r>
-              <a:rPr kumimoji="1" lang="en-US" altLang="ja-JP" dirty="0" smtClean="0"/>
-              <a:t>C</a:t>
-            </a:r>
-            <a:r>
-              <a:rPr kumimoji="1" lang="ja-JP" altLang="en-US" dirty="0" smtClean="0"/>
-              <a:t>でも、既定値では丸カッコは</a:t>
-            </a:r>
-            <a:r>
-              <a:rPr kumimoji="1" lang="en-US" altLang="ja-JP" dirty="0" smtClean="0"/>
-              <a:t>1</a:t>
-            </a:r>
-            <a:r>
-              <a:rPr kumimoji="1" lang="ja-JP" altLang="en-US" dirty="0" smtClean="0"/>
-              <a:t>～</a:t>
-            </a:r>
-            <a:r>
-              <a:rPr kumimoji="1" lang="en-US" altLang="ja-JP" dirty="0" smtClean="0"/>
-              <a:t>N</a:t>
-            </a:r>
-            <a:r>
-              <a:rPr kumimoji="1" lang="ja-JP" altLang="en-US" dirty="0" smtClean="0"/>
-              <a:t>（</a:t>
-            </a:r>
-            <a:r>
-              <a:rPr kumimoji="1" lang="en-US" altLang="ja-JP" dirty="0" smtClean="0"/>
-              <a:t>Fortran</a:t>
-            </a:r>
-            <a:r>
-              <a:rPr kumimoji="1" lang="ja-JP" altLang="en-US" dirty="0" smtClean="0"/>
-              <a:t>式）</a:t>
-            </a:r>
-            <a:endParaRPr kumimoji="1" lang="ja-JP" altLang="en-US" dirty="0"/>
-          </a:p>
-        </p:txBody>
-      </p:sp>
-      <p:cxnSp>
-        <p:nvCxnSpPr>
-          <p:cNvPr id="15" name="直線矢印コネクタ 14"/>
-          <p:cNvCxnSpPr/>
-          <p:nvPr/>
-        </p:nvCxnSpPr>
-        <p:spPr>
-          <a:xfrm flipV="1">
-            <a:off x="6516216" y="4293096"/>
-            <a:ext cx="1008112" cy="1224136"/>
-          </a:xfrm>
-          <a:prstGeom prst="straightConnector1">
-            <a:avLst/>
-          </a:prstGeom>
-          <a:ln>
-            <a:tailEnd type="triangle"/>
-          </a:ln>
-        </p:spPr>
-        <p:style>
-          <a:lnRef idx="1">
-            <a:schemeClr val="accent1"/>
-          </a:lnRef>
-          <a:fillRef idx="0">
-            <a:schemeClr val="accent1"/>
-          </a:fillRef>
-          <a:effectRef idx="0">
-            <a:schemeClr val="accent1"/>
-          </a:effectRef>
-          <a:fontRef idx="minor">
-            <a:schemeClr val="tx1"/>
-          </a:fontRef>
-        </p:style>
-      </p:cxnSp>
     </p:spTree>
     <p:extLst>
       <p:ext uri="{BB962C8B-B14F-4D97-AF65-F5344CB8AC3E}">
@@ -11894,7 +11795,7 @@
         <p:spPr bwMode="auto">
           <a:xfrm>
             <a:off x="2685559" y="4191471"/>
-            <a:ext cx="4262705" cy="461665"/>
+            <a:ext cx="4432624" cy="461665"/>
           </a:xfrm>
           <a:prstGeom prst="rect">
             <a:avLst/>
@@ -11943,7 +11844,14 @@
                 <a:latin typeface="Consolas" pitchFamily="49" charset="0"/>
                 <a:cs typeface="Consolas" pitchFamily="49" charset="0"/>
               </a:rPr>
-              <a:t>nodes p(4,4)</a:t>
+              <a:t>nodes p[4][4</a:t>
+            </a:r>
+            <a:r>
+              <a:rPr lang="en-US" altLang="ja-JP" sz="2400" dirty="0">
+                <a:latin typeface="Consolas" pitchFamily="49" charset="0"/>
+                <a:cs typeface="Consolas" pitchFamily="49" charset="0"/>
+              </a:rPr>
+              <a:t>]</a:t>
             </a:r>
             <a:endParaRPr lang="ja-JP" altLang="en-US" sz="2400" dirty="0">
               <a:latin typeface="Consolas" pitchFamily="49" charset="0"/>
@@ -12297,7 +12205,7 @@
         <p:spPr bwMode="auto">
           <a:xfrm>
             <a:off x="2685559" y="3284984"/>
-            <a:ext cx="4262705" cy="830997"/>
+            <a:ext cx="4432624" cy="830997"/>
           </a:xfrm>
           <a:prstGeom prst="rect">
             <a:avLst/>
@@ -12346,7 +12254,7 @@
                 <a:latin typeface="Consolas" pitchFamily="49" charset="0"/>
                 <a:cs typeface="Consolas" pitchFamily="49" charset="0"/>
               </a:rPr>
-              <a:t>nodes p(</a:t>
+              <a:t>nodes p[</a:t>
             </a:r>
             <a:r>
               <a:rPr lang="en-US" altLang="ja-JP" sz="2400" dirty="0" smtClean="0">
@@ -12359,11 +12267,11 @@
               <a:t>*</a:t>
             </a:r>
             <a:r>
-              <a:rPr lang="en-US" altLang="ja-JP" sz="2400" dirty="0" smtClean="0">
+              <a:rPr lang="en-US" altLang="ja-JP" sz="2400" dirty="0">
                 <a:latin typeface="Consolas" pitchFamily="49" charset="0"/>
                 <a:cs typeface="Consolas" pitchFamily="49" charset="0"/>
               </a:rPr>
-              <a:t>)</a:t>
+              <a:t>]</a:t>
             </a:r>
             <a:endParaRPr lang="ja-JP" altLang="en-US" sz="2400" dirty="0" smtClean="0">
               <a:latin typeface="Consolas" pitchFamily="49" charset="0"/>
@@ -12376,10 +12284,10 @@
                 <a:latin typeface="Consolas" pitchFamily="49" charset="0"/>
                 <a:cs typeface="Consolas" pitchFamily="49" charset="0"/>
               </a:rPr>
-              <a:t>#pragma xmp nodes p(4,</a:t>
-            </a:r>
-            <a:r>
-              <a:rPr lang="en-US" altLang="ja-JP" sz="2400" dirty="0" smtClean="0">
+              <a:t>#pragma xmp nodes p[</a:t>
+            </a:r>
+            <a:r>
+              <a:rPr lang="en-US" altLang="ja-JP" sz="2400" dirty="0">
                 <a:solidFill>
                   <a:srgbClr val="FF0000"/>
                 </a:solidFill>
@@ -12393,7 +12301,7 @@
                 <a:latin typeface="Consolas" pitchFamily="49" charset="0"/>
                 <a:cs typeface="Consolas" pitchFamily="49" charset="0"/>
               </a:rPr>
-              <a:t>)</a:t>
+              <a:t>][4]</a:t>
             </a:r>
             <a:endParaRPr lang="ja-JP" altLang="en-US" sz="2400" dirty="0">
               <a:latin typeface="Consolas" pitchFamily="49" charset="0"/>
@@ -12655,8 +12563,8 @@
         </p:nvCxnSpPr>
         <p:spPr>
           <a:xfrm flipV="1">
-            <a:off x="5364348" y="4032405"/>
-            <a:ext cx="1223876" cy="1439120"/>
+            <a:off x="5364348" y="4115981"/>
+            <a:ext cx="863836" cy="1355544"/>
           </a:xfrm>
           <a:prstGeom prst="straightConnector1">
             <a:avLst/>
@@ -13107,7 +13015,7 @@
         <p:spPr bwMode="auto">
           <a:xfrm>
             <a:off x="2685559" y="4191471"/>
-            <a:ext cx="5112297" cy="461665"/>
+            <a:ext cx="5282215" cy="461665"/>
           </a:xfrm>
           <a:prstGeom prst="rect">
             <a:avLst/>
@@ -13156,7 +13064,7 @@
                 <a:latin typeface="Consolas" pitchFamily="49" charset="0"/>
                 <a:cs typeface="Consolas" pitchFamily="49" charset="0"/>
               </a:rPr>
-              <a:t>template t(64,64)</a:t>
+              <a:t>template t[64][64]</a:t>
             </a:r>
             <a:endParaRPr lang="ja-JP" altLang="en-US" sz="2400" dirty="0">
               <a:latin typeface="Consolas" pitchFamily="49" charset="0"/>
@@ -13573,14 +13481,14 @@
                 <a:latin typeface="Consolas" pitchFamily="49" charset="0"/>
                 <a:cs typeface="Consolas" pitchFamily="49" charset="0"/>
               </a:rPr>
-              <a:t>#</a:t>
+              <a:t>#pragma </a:t>
             </a:r>
             <a:r>
               <a:rPr lang="en-US" altLang="ja-JP" sz="2000" dirty="0" err="1" smtClean="0">
                 <a:latin typeface="Consolas" pitchFamily="49" charset="0"/>
                 <a:cs typeface="Consolas" pitchFamily="49" charset="0"/>
               </a:rPr>
-              <a:t>pragma</a:t>
+              <a:t>xmp</a:t>
             </a:r>
             <a:r>
               <a:rPr lang="en-US" altLang="ja-JP" sz="2000" dirty="0" smtClean="0">
@@ -13590,42 +13498,42 @@
               <a:t> </a:t>
             </a:r>
             <a:r>
-              <a:rPr lang="en-US" altLang="ja-JP" sz="2000" dirty="0" err="1" smtClean="0">
+              <a:rPr lang="en-US" altLang="ja-JP" sz="2000" dirty="0">
                 <a:latin typeface="Consolas" pitchFamily="49" charset="0"/>
                 <a:cs typeface="Consolas" pitchFamily="49" charset="0"/>
               </a:rPr>
-              <a:t>xmp</a:t>
+              <a:t>distribute </a:t>
             </a:r>
             <a:r>
               <a:rPr lang="en-US" altLang="ja-JP" sz="2000" dirty="0" smtClean="0">
                 <a:latin typeface="Consolas" pitchFamily="49" charset="0"/>
                 <a:cs typeface="Consolas" pitchFamily="49" charset="0"/>
               </a:rPr>
-              <a:t> </a:t>
+              <a:t>t[</a:t>
+            </a:r>
+            <a:r>
+              <a:rPr lang="en-US" altLang="ja-JP" sz="2000" dirty="0" smtClean="0">
+                <a:solidFill>
+                  <a:srgbClr val="FF0000"/>
+                </a:solidFill>
+                <a:latin typeface="Consolas" pitchFamily="49" charset="0"/>
+                <a:cs typeface="Consolas" pitchFamily="49" charset="0"/>
+              </a:rPr>
+              <a:t>block</a:t>
+            </a:r>
+            <a:r>
+              <a:rPr lang="en-US" altLang="ja-JP" sz="2000" dirty="0" smtClean="0">
+                <a:latin typeface="Consolas" pitchFamily="49" charset="0"/>
+                <a:cs typeface="Consolas" pitchFamily="49" charset="0"/>
+              </a:rPr>
+              <a:t>] onto </a:t>
             </a:r>
             <a:r>
               <a:rPr lang="en-US" altLang="ja-JP" sz="2000" dirty="0">
                 <a:latin typeface="Consolas" pitchFamily="49" charset="0"/>
                 <a:cs typeface="Consolas" pitchFamily="49" charset="0"/>
               </a:rPr>
-              <a:t>distribute t(</a:t>
-            </a:r>
-            <a:r>
-              <a:rPr lang="en-US" altLang="ja-JP" sz="2000" dirty="0">
-                <a:solidFill>
-                  <a:srgbClr val="FF0000"/>
-                </a:solidFill>
-                <a:latin typeface="Consolas" pitchFamily="49" charset="0"/>
-                <a:cs typeface="Consolas" pitchFamily="49" charset="0"/>
-              </a:rPr>
-              <a:t>block</a:t>
-            </a:r>
-            <a:r>
-              <a:rPr lang="en-US" altLang="ja-JP" sz="2000" dirty="0">
-                <a:latin typeface="Consolas" pitchFamily="49" charset="0"/>
-                <a:cs typeface="Consolas" pitchFamily="49" charset="0"/>
-              </a:rPr>
-              <a:t>) onto p</a:t>
+              <a:t>p</a:t>
             </a:r>
           </a:p>
         </p:txBody>
@@ -14364,7 +14272,31 @@
                 <a:cs typeface="Consolas" panose="020B0609020204030204" pitchFamily="49" charset="0"/>
                 <a:sym typeface="Arial" panose="020B0604020202020204" pitchFamily="34" charset="0"/>
               </a:rPr>
-              <a:t> nodes p(4)</a:t>
+              <a:t> nodes </a:t>
+            </a:r>
+            <a:r>
+              <a:rPr kumimoji="0" lang="en-US" altLang="ja-JP" sz="1400" dirty="0" smtClean="0">
+                <a:solidFill>
+                  <a:schemeClr val="tx1"/>
+                </a:solidFill>
+                <a:latin typeface="Consolas" panose="020B0609020204030204" pitchFamily="49" charset="0"/>
+                <a:ea typeface="ＭＳ Ｐゴシック" panose="020B0600070205080204" pitchFamily="50" charset="-128"/>
+                <a:cs typeface="Consolas" panose="020B0609020204030204" pitchFamily="49" charset="0"/>
+                <a:sym typeface="Arial" panose="020B0604020202020204" pitchFamily="34" charset="0"/>
+              </a:rPr>
+              <a:t>p[4</a:t>
+            </a:r>
+            <a:r>
+              <a:rPr kumimoji="0" lang="en-US" altLang="ja-JP" sz="1400" dirty="0">
+                <a:solidFill>
+                  <a:schemeClr val="tx1"/>
+                </a:solidFill>
+                <a:latin typeface="Consolas" panose="020B0609020204030204" pitchFamily="49" charset="0"/>
+                <a:ea typeface="ＭＳ Ｐゴシック" panose="020B0600070205080204" pitchFamily="50" charset="-128"/>
+                <a:cs typeface="Consolas" panose="020B0609020204030204" pitchFamily="49" charset="0"/>
+                <a:sym typeface="Arial" panose="020B0604020202020204" pitchFamily="34" charset="0"/>
+              </a:rPr>
+              <a:t>]</a:t>
             </a:r>
           </a:p>
           <a:p>
@@ -14419,8 +14351,29 @@
                 <a:cs typeface="Consolas" panose="020B0609020204030204" pitchFamily="49" charset="0"/>
                 <a:sym typeface="Arial" panose="020B0604020202020204" pitchFamily="34" charset="0"/>
               </a:rPr>
-              <a:t> template t(0:19)</a:t>
-            </a:r>
+              <a:t> template </a:t>
+            </a:r>
+            <a:r>
+              <a:rPr kumimoji="0" lang="en-US" altLang="ja-JP" sz="1400" dirty="0" smtClean="0">
+                <a:solidFill>
+                  <a:schemeClr val="tx1"/>
+                </a:solidFill>
+                <a:latin typeface="Consolas" panose="020B0609020204030204" pitchFamily="49" charset="0"/>
+                <a:ea typeface="ＭＳ Ｐゴシック" panose="020B0600070205080204" pitchFamily="50" charset="-128"/>
+                <a:cs typeface="Consolas" panose="020B0609020204030204" pitchFamily="49" charset="0"/>
+                <a:sym typeface="Arial" panose="020B0604020202020204" pitchFamily="34" charset="0"/>
+              </a:rPr>
+              <a:t>t[20]</a:t>
+            </a:r>
+            <a:endParaRPr kumimoji="0" lang="en-US" altLang="ja-JP" sz="1400" dirty="0">
+              <a:solidFill>
+                <a:schemeClr val="tx1"/>
+              </a:solidFill>
+              <a:latin typeface="Consolas" panose="020B0609020204030204" pitchFamily="49" charset="0"/>
+              <a:ea typeface="ＭＳ Ｐゴシック" panose="020B0600070205080204" pitchFamily="50" charset="-128"/>
+              <a:cs typeface="Consolas" panose="020B0609020204030204" pitchFamily="49" charset="0"/>
+              <a:sym typeface="Arial" panose="020B0604020202020204" pitchFamily="34" charset="0"/>
+            </a:endParaRPr>
           </a:p>
           <a:p>
             <a:pPr>
@@ -14477,19 +14430,55 @@
                 <a:cs typeface="Consolas" panose="020B0609020204030204" pitchFamily="49" charset="0"/>
                 <a:sym typeface="Arial" panose="020B0604020202020204" pitchFamily="34" charset="0"/>
               </a:rPr>
-              <a:t> distribute t(</a:t>
+              <a:t> distribute </a:t>
+            </a:r>
+            <a:r>
+              <a:rPr kumimoji="0" lang="en-US" altLang="ja-JP" sz="1400" dirty="0" smtClean="0">
+                <a:solidFill>
+                  <a:schemeClr val="tx1"/>
+                </a:solidFill>
+                <a:latin typeface="Consolas" panose="020B0609020204030204" pitchFamily="49" charset="0"/>
+                <a:ea typeface="ＭＳ Ｐゴシック" panose="020B0600070205080204" pitchFamily="50" charset="-128"/>
+                <a:cs typeface="Consolas" panose="020B0609020204030204" pitchFamily="49" charset="0"/>
+                <a:sym typeface="Arial" panose="020B0604020202020204" pitchFamily="34" charset="0"/>
+              </a:rPr>
+              <a:t>t[</a:t>
+            </a:r>
+            <a:r>
+              <a:rPr kumimoji="0" lang="en-US" altLang="ja-JP" sz="1400" dirty="0" smtClean="0">
+                <a:solidFill>
+                  <a:srgbClr val="FF0000"/>
+                </a:solidFill>
+                <a:latin typeface="Consolas" panose="020B0609020204030204" pitchFamily="49" charset="0"/>
+                <a:ea typeface="ＭＳ Ｐゴシック" panose="020B0600070205080204" pitchFamily="50" charset="-128"/>
+                <a:cs typeface="Consolas" panose="020B0609020204030204" pitchFamily="49" charset="0"/>
+                <a:sym typeface="Arial" panose="020B0604020202020204" pitchFamily="34" charset="0"/>
+              </a:rPr>
+              <a:t>block</a:t>
             </a:r>
             <a:r>
               <a:rPr kumimoji="0" lang="en-US" altLang="ja-JP" sz="1400" dirty="0">
                 <a:solidFill>
-                  <a:srgbClr val="FF0000"/>
+                  <a:schemeClr val="tx1"/>
                 </a:solidFill>
                 <a:latin typeface="Consolas" panose="020B0609020204030204" pitchFamily="49" charset="0"/>
                 <a:ea typeface="ＭＳ Ｐゴシック" panose="020B0600070205080204" pitchFamily="50" charset="-128"/>
                 <a:cs typeface="Consolas" panose="020B0609020204030204" pitchFamily="49" charset="0"/>
                 <a:sym typeface="Arial" panose="020B0604020202020204" pitchFamily="34" charset="0"/>
               </a:rPr>
-              <a:t>block</a:t>
+              <a:t>]</a:t>
+            </a:r>
+            <a:r>
+              <a:rPr kumimoji="0" lang="en-US" altLang="ja-JP" sz="1400" dirty="0" smtClean="0">
+                <a:solidFill>
+                  <a:schemeClr val="tx1"/>
+                </a:solidFill>
+                <a:latin typeface="Consolas" panose="020B0609020204030204" pitchFamily="49" charset="0"/>
+                <a:ea typeface="ＭＳ Ｐゴシック" panose="020B0600070205080204" pitchFamily="50" charset="-128"/>
+                <a:cs typeface="Consolas" panose="020B0609020204030204" pitchFamily="49" charset="0"/>
+                <a:sym typeface="Arial" panose="020B0604020202020204" pitchFamily="34" charset="0"/>
+              </a:rPr>
+              <a:t> </a:t>
             </a:r>
             <a:r>
               <a:rPr kumimoji="0" lang="en-US" altLang="ja-JP" sz="1400" dirty="0">
@@ -14501,7 +14490,7 @@
                 <a:cs typeface="Consolas" panose="020B0609020204030204" pitchFamily="49" charset="0"/>
                 <a:sym typeface="Arial" panose="020B0604020202020204" pitchFamily="34" charset="0"/>
               </a:rPr>
-              <a:t>) onto p</a:t>
+              <a:t>onto p</a:t>
             </a:r>
           </a:p>
         </p:txBody>
@@ -15830,7 +15819,31 @@
                 <a:cs typeface="Consolas" panose="020B0609020204030204" pitchFamily="49" charset="0"/>
                 <a:sym typeface="Arial" panose="020B0604020202020204" pitchFamily="34" charset="0"/>
               </a:rPr>
-              <a:t> nodes p(4)</a:t>
+              <a:t> nodes </a:t>
+            </a:r>
+            <a:r>
+              <a:rPr kumimoji="0" lang="en-US" altLang="ja-JP" sz="1400" dirty="0" smtClean="0">
+                <a:solidFill>
+                  <a:schemeClr val="tx1"/>
+                </a:solidFill>
+                <a:latin typeface="Consolas" panose="020B0609020204030204" pitchFamily="49" charset="0"/>
+                <a:ea typeface="ＭＳ Ｐゴシック" panose="020B0600070205080204" pitchFamily="50" charset="-128"/>
+                <a:cs typeface="Consolas" panose="020B0609020204030204" pitchFamily="49" charset="0"/>
+                <a:sym typeface="Arial" panose="020B0604020202020204" pitchFamily="34" charset="0"/>
+              </a:rPr>
+              <a:t>p[4</a:t>
+            </a:r>
+            <a:r>
+              <a:rPr kumimoji="0" lang="en-US" altLang="ja-JP" sz="1400" dirty="0">
+                <a:solidFill>
+                  <a:schemeClr val="tx1"/>
+                </a:solidFill>
+                <a:latin typeface="Consolas" panose="020B0609020204030204" pitchFamily="49" charset="0"/>
+                <a:ea typeface="ＭＳ Ｐゴシック" panose="020B0600070205080204" pitchFamily="50" charset="-128"/>
+                <a:cs typeface="Consolas" panose="020B0609020204030204" pitchFamily="49" charset="0"/>
+                <a:sym typeface="Arial" panose="020B0604020202020204" pitchFamily="34" charset="0"/>
+              </a:rPr>
+              <a:t>]</a:t>
             </a:r>
           </a:p>
           <a:p>
@@ -15885,8 +15898,29 @@
                 <a:cs typeface="Consolas" panose="020B0609020204030204" pitchFamily="49" charset="0"/>
                 <a:sym typeface="Arial" panose="020B0604020202020204" pitchFamily="34" charset="0"/>
               </a:rPr>
-              <a:t> template t(0:19)</a:t>
-            </a:r>
+              <a:t> template </a:t>
+            </a:r>
+            <a:r>
+              <a:rPr kumimoji="0" lang="en-US" altLang="ja-JP" sz="1400" dirty="0" smtClean="0">
+                <a:solidFill>
+                  <a:schemeClr val="tx1"/>
+                </a:solidFill>
+                <a:latin typeface="Consolas" panose="020B0609020204030204" pitchFamily="49" charset="0"/>
+                <a:ea typeface="ＭＳ Ｐゴシック" panose="020B0600070205080204" pitchFamily="50" charset="-128"/>
+                <a:cs typeface="Consolas" panose="020B0609020204030204" pitchFamily="49" charset="0"/>
+                <a:sym typeface="Arial" panose="020B0604020202020204" pitchFamily="34" charset="0"/>
+              </a:rPr>
+              <a:t>t[20]</a:t>
+            </a:r>
+            <a:endParaRPr kumimoji="0" lang="en-US" altLang="ja-JP" sz="1400" dirty="0">
+              <a:solidFill>
+                <a:schemeClr val="tx1"/>
+              </a:solidFill>
+              <a:latin typeface="Consolas" panose="020B0609020204030204" pitchFamily="49" charset="0"/>
+              <a:ea typeface="ＭＳ Ｐゴシック" panose="020B0600070205080204" pitchFamily="50" charset="-128"/>
+              <a:cs typeface="Consolas" panose="020B0609020204030204" pitchFamily="49" charset="0"/>
+              <a:sym typeface="Arial" panose="020B0604020202020204" pitchFamily="34" charset="0"/>
+            </a:endParaRPr>
           </a:p>
           <a:p>
             <a:pPr>
@@ -15943,19 +15977,55 @@
                 <a:cs typeface="Consolas" panose="020B0609020204030204" pitchFamily="49" charset="0"/>
                 <a:sym typeface="Arial" panose="020B0604020202020204" pitchFamily="34" charset="0"/>
               </a:rPr>
-              <a:t> distribute t(</a:t>
+              <a:t> distribute </a:t>
+            </a:r>
+            <a:r>
+              <a:rPr kumimoji="0" lang="en-US" altLang="ja-JP" sz="1400" dirty="0" smtClean="0">
+                <a:solidFill>
+                  <a:schemeClr val="tx1"/>
+                </a:solidFill>
+                <a:latin typeface="Consolas" panose="020B0609020204030204" pitchFamily="49" charset="0"/>
+                <a:ea typeface="ＭＳ Ｐゴシック" panose="020B0600070205080204" pitchFamily="50" charset="-128"/>
+                <a:cs typeface="Consolas" panose="020B0609020204030204" pitchFamily="49" charset="0"/>
+                <a:sym typeface="Arial" panose="020B0604020202020204" pitchFamily="34" charset="0"/>
+              </a:rPr>
+              <a:t>t[</a:t>
+            </a:r>
+            <a:r>
+              <a:rPr kumimoji="0" lang="en-US" altLang="ja-JP" sz="1400" dirty="0" smtClean="0">
+                <a:solidFill>
+                  <a:srgbClr val="FF0000"/>
+                </a:solidFill>
+                <a:latin typeface="Consolas" panose="020B0609020204030204" pitchFamily="49" charset="0"/>
+                <a:ea typeface="ＭＳ Ｐゴシック" panose="020B0600070205080204" pitchFamily="50" charset="-128"/>
+                <a:cs typeface="Consolas" panose="020B0609020204030204" pitchFamily="49" charset="0"/>
+                <a:sym typeface="Arial" panose="020B0604020202020204" pitchFamily="34" charset="0"/>
+              </a:rPr>
+              <a:t>cyclic</a:t>
             </a:r>
             <a:r>
               <a:rPr kumimoji="0" lang="en-US" altLang="ja-JP" sz="1400" dirty="0">
                 <a:solidFill>
-                  <a:srgbClr val="FF0000"/>
+                  <a:schemeClr val="tx1"/>
                 </a:solidFill>
                 <a:latin typeface="Consolas" panose="020B0609020204030204" pitchFamily="49" charset="0"/>
                 <a:ea typeface="ＭＳ Ｐゴシック" panose="020B0600070205080204" pitchFamily="50" charset="-128"/>
                 <a:cs typeface="Consolas" panose="020B0609020204030204" pitchFamily="49" charset="0"/>
                 <a:sym typeface="Arial" panose="020B0604020202020204" pitchFamily="34" charset="0"/>
               </a:rPr>
-              <a:t>cyclic</a:t>
+              <a:t>]</a:t>
+            </a:r>
+            <a:r>
+              <a:rPr kumimoji="0" lang="en-US" altLang="ja-JP" sz="1400" dirty="0" smtClean="0">
+                <a:solidFill>
+                  <a:schemeClr val="tx1"/>
+                </a:solidFill>
+                <a:latin typeface="Consolas" panose="020B0609020204030204" pitchFamily="49" charset="0"/>
+                <a:ea typeface="ＭＳ Ｐゴシック" panose="020B0600070205080204" pitchFamily="50" charset="-128"/>
+                <a:cs typeface="Consolas" panose="020B0609020204030204" pitchFamily="49" charset="0"/>
+                <a:sym typeface="Arial" panose="020B0604020202020204" pitchFamily="34" charset="0"/>
+              </a:rPr>
+              <a:t> </a:t>
             </a:r>
             <a:r>
               <a:rPr kumimoji="0" lang="en-US" altLang="ja-JP" sz="1400" dirty="0">
@@ -15967,7 +16037,7 @@
                 <a:cs typeface="Consolas" panose="020B0609020204030204" pitchFamily="49" charset="0"/>
                 <a:sym typeface="Arial" panose="020B0604020202020204" pitchFamily="34" charset="0"/>
               </a:rPr>
-              <a:t>) onto p</a:t>
+              <a:t>onto p</a:t>
             </a:r>
           </a:p>
         </p:txBody>
@@ -17593,16 +17663,16 @@
           <a:p>
             <a:pPr algn="ctr"/>
             <a:r>
-              <a:rPr lang="en-US" altLang="ja-JP" sz="1100" dirty="0" smtClean="0">
+              <a:rPr lang="en-US" altLang="ja-JP" sz="1000" dirty="0" smtClean="0">
                 <a:solidFill>
                   <a:schemeClr val="tx1"/>
                 </a:solidFill>
                 <a:latin typeface="Consolas" panose="020B0609020204030204" pitchFamily="49" charset="0"/>
                 <a:cs typeface="Consolas" panose="020B0609020204030204" pitchFamily="49" charset="0"/>
               </a:rPr>
-              <a:t>p2(1,1)</a:t>
-            </a:r>
-            <a:endParaRPr kumimoji="1" lang="ja-JP" altLang="en-US" sz="1100" dirty="0">
+              <a:t>P2[0][0]</a:t>
+            </a:r>
+            <a:endParaRPr kumimoji="1" lang="ja-JP" altLang="en-US" sz="1000" dirty="0">
               <a:solidFill>
                 <a:schemeClr val="tx1"/>
               </a:solidFill>
@@ -17657,16 +17727,16 @@
           <a:p>
             <a:pPr algn="ctr"/>
             <a:r>
-              <a:rPr kumimoji="1" lang="en-US" altLang="ja-JP" sz="1100" dirty="0" smtClean="0">
+              <a:rPr kumimoji="1" lang="en-US" altLang="ja-JP" sz="1000" dirty="0" smtClean="0">
                 <a:solidFill>
                   <a:schemeClr val="tx1"/>
                 </a:solidFill>
                 <a:latin typeface="Consolas" panose="020B0609020204030204" pitchFamily="49" charset="0"/>
                 <a:cs typeface="Consolas" panose="020B0609020204030204" pitchFamily="49" charset="0"/>
               </a:rPr>
-              <a:t>p2(2,1)</a:t>
-            </a:r>
-            <a:endParaRPr kumimoji="1" lang="ja-JP" altLang="en-US" sz="1100" dirty="0">
+              <a:t>P2[1][0]</a:t>
+            </a:r>
+            <a:endParaRPr kumimoji="1" lang="ja-JP" altLang="en-US" sz="1000" dirty="0">
               <a:solidFill>
                 <a:schemeClr val="tx1"/>
               </a:solidFill>
@@ -17721,16 +17791,16 @@
           <a:p>
             <a:pPr algn="ctr"/>
             <a:r>
-              <a:rPr kumimoji="1" lang="en-US" altLang="ja-JP" sz="1100" dirty="0" smtClean="0">
+              <a:rPr kumimoji="1" lang="en-US" altLang="ja-JP" sz="1000" dirty="0" smtClean="0">
                 <a:solidFill>
                   <a:schemeClr val="tx1"/>
                 </a:solidFill>
                 <a:latin typeface="Consolas" panose="020B0609020204030204" pitchFamily="49" charset="0"/>
                 <a:cs typeface="Consolas" panose="020B0609020204030204" pitchFamily="49" charset="0"/>
               </a:rPr>
-              <a:t>p2(1,2)</a:t>
-            </a:r>
-            <a:endParaRPr kumimoji="1" lang="ja-JP" altLang="en-US" sz="1100" dirty="0">
+              <a:t>P2[0][1]</a:t>
+            </a:r>
+            <a:endParaRPr kumimoji="1" lang="ja-JP" altLang="en-US" sz="1000" dirty="0">
               <a:solidFill>
                 <a:schemeClr val="tx1"/>
               </a:solidFill>
@@ -17785,16 +17855,16 @@
           <a:p>
             <a:pPr algn="ctr"/>
             <a:r>
-              <a:rPr kumimoji="1" lang="en-US" altLang="ja-JP" sz="1100" dirty="0" smtClean="0">
+              <a:rPr kumimoji="1" lang="en-US" altLang="ja-JP" sz="1000" dirty="0" smtClean="0">
                 <a:solidFill>
                   <a:schemeClr val="tx1"/>
                 </a:solidFill>
                 <a:latin typeface="Consolas" panose="020B0609020204030204" pitchFamily="49" charset="0"/>
                 <a:cs typeface="Consolas" panose="020B0609020204030204" pitchFamily="49" charset="0"/>
               </a:rPr>
-              <a:t>p2(2,2)</a:t>
-            </a:r>
-            <a:endParaRPr kumimoji="1" lang="ja-JP" altLang="en-US" sz="1100" dirty="0">
+              <a:t>P2[1][1]</a:t>
+            </a:r>
+            <a:endParaRPr kumimoji="1" lang="ja-JP" altLang="en-US" sz="1000" dirty="0">
               <a:solidFill>
                 <a:schemeClr val="tx1"/>
               </a:solidFill>
@@ -18069,7 +18139,7 @@
         <p:spPr>
           <a:xfrm>
             <a:off x="1691680" y="1700808"/>
-            <a:ext cx="5234125" cy="584775"/>
+            <a:ext cx="5346335" cy="584775"/>
           </a:xfrm>
           <a:prstGeom prst="rect">
             <a:avLst/>
@@ -18108,7 +18178,7 @@
                 <a:latin typeface="Consolas" panose="020B0609020204030204" pitchFamily="49" charset="0"/>
                 <a:cs typeface="Consolas" panose="020B0609020204030204" pitchFamily="49" charset="0"/>
               </a:rPr>
-              <a:t> nodes p2(2,2)</a:t>
+              <a:t> nodes p2[2][2]</a:t>
             </a:r>
           </a:p>
           <a:p>
@@ -18131,24 +18201,48 @@
                 <a:latin typeface="Consolas" panose="020B0609020204030204" pitchFamily="49" charset="0"/>
                 <a:cs typeface="Consolas" panose="020B0609020204030204" pitchFamily="49" charset="0"/>
               </a:rPr>
-              <a:t> distribute t(</a:t>
-            </a:r>
-            <a:r>
-              <a:rPr kumimoji="1" lang="en-US" altLang="ja-JP" sz="1600" dirty="0" err="1" smtClean="0">
+              <a:t> distribute t[</a:t>
+            </a:r>
+            <a:r>
+              <a:rPr kumimoji="1" lang="en-US" altLang="ja-JP" sz="1600" dirty="0" smtClean="0">
                 <a:solidFill>
                   <a:srgbClr val="FF0000"/>
                 </a:solidFill>
                 <a:latin typeface="Consolas" panose="020B0609020204030204" pitchFamily="49" charset="0"/>
                 <a:cs typeface="Consolas" panose="020B0609020204030204" pitchFamily="49" charset="0"/>
               </a:rPr>
-              <a:t>block,block</a:t>
+              <a:t>block</a:t>
             </a:r>
             <a:r>
               <a:rPr kumimoji="1" lang="en-US" altLang="ja-JP" sz="1600" dirty="0" smtClean="0">
                 <a:latin typeface="Consolas" panose="020B0609020204030204" pitchFamily="49" charset="0"/>
                 <a:cs typeface="Consolas" panose="020B0609020204030204" pitchFamily="49" charset="0"/>
               </a:rPr>
-              <a:t>) onto p2</a:t>
+              <a:t>][</a:t>
+            </a:r>
+            <a:r>
+              <a:rPr kumimoji="1" lang="en-US" altLang="ja-JP" sz="1600" dirty="0" smtClean="0">
+                <a:solidFill>
+                  <a:srgbClr val="FF0000"/>
+                </a:solidFill>
+                <a:latin typeface="Consolas" panose="020B0609020204030204" pitchFamily="49" charset="0"/>
+                <a:cs typeface="Consolas" panose="020B0609020204030204" pitchFamily="49" charset="0"/>
+              </a:rPr>
+              <a:t>block</a:t>
+            </a:r>
+            <a:r>
+              <a:rPr kumimoji="1" lang="en-US" altLang="ja-JP" sz="1600" dirty="0">
+                <a:latin typeface="Consolas" panose="020B0609020204030204" pitchFamily="49" charset="0"/>
+                <a:cs typeface="Consolas" panose="020B0609020204030204" pitchFamily="49" charset="0"/>
+              </a:rPr>
+              <a:t>]</a:t>
+            </a:r>
+            <a:r>
+              <a:rPr kumimoji="1" lang="en-US" altLang="ja-JP" sz="1600" dirty="0" smtClean="0">
+                <a:latin typeface="Consolas" panose="020B0609020204030204" pitchFamily="49" charset="0"/>
+                <a:cs typeface="Consolas" panose="020B0609020204030204" pitchFamily="49" charset="0"/>
+              </a:rPr>
+              <a:t> onto p2</a:t>
             </a:r>
             <a:endParaRPr kumimoji="1" lang="ja-JP" altLang="en-US" sz="1600" dirty="0">
               <a:latin typeface="Consolas" panose="020B0609020204030204" pitchFamily="49" charset="0"/>
@@ -18205,7 +18299,7 @@
                 <a:latin typeface="Consolas" panose="020B0609020204030204" pitchFamily="49" charset="0"/>
                 <a:cs typeface="Consolas" panose="020B0609020204030204" pitchFamily="49" charset="0"/>
               </a:rPr>
-              <a:t> nodes p1(4)</a:t>
+              <a:t> nodes p1[4]</a:t>
             </a:r>
           </a:p>
           <a:p>
@@ -18228,7 +18322,7 @@
                 <a:latin typeface="Consolas" panose="020B0609020204030204" pitchFamily="49" charset="0"/>
                 <a:cs typeface="Consolas" panose="020B0609020204030204" pitchFamily="49" charset="0"/>
               </a:rPr>
-              <a:t> distribute t(</a:t>
+              <a:t> distribute t[block][</a:t>
             </a:r>
             <a:r>
               <a:rPr kumimoji="1" lang="en-US" altLang="ja-JP" sz="1600" dirty="0" smtClean="0">
@@ -18238,14 +18332,14 @@
                 <a:latin typeface="Consolas" panose="020B0609020204030204" pitchFamily="49" charset="0"/>
                 <a:cs typeface="Consolas" panose="020B0609020204030204" pitchFamily="49" charset="0"/>
               </a:rPr>
-              <a:t>block,*</a:t>
+              <a:t>*</a:t>
             </a:r>
             <a:r>
               <a:rPr kumimoji="1" lang="en-US" altLang="ja-JP" sz="1600" dirty="0" smtClean="0">
                 <a:latin typeface="Consolas" panose="020B0609020204030204" pitchFamily="49" charset="0"/>
                 <a:cs typeface="Consolas" panose="020B0609020204030204" pitchFamily="49" charset="0"/>
               </a:rPr>
-              <a:t>) onto p1</a:t>
+              <a:t>] onto p1</a:t>
             </a:r>
             <a:endParaRPr kumimoji="1" lang="ja-JP" altLang="en-US" sz="1600" dirty="0">
               <a:latin typeface="Consolas" panose="020B0609020204030204" pitchFamily="49" charset="0"/>
@@ -18315,8 +18409,8 @@
         </p:nvCxnSpPr>
         <p:spPr>
           <a:xfrm flipH="1" flipV="1">
-            <a:off x="5292080" y="4509120"/>
-            <a:ext cx="576064" cy="976754"/>
+            <a:off x="5364088" y="4509120"/>
+            <a:ext cx="504056" cy="976754"/>
           </a:xfrm>
           <a:prstGeom prst="straightConnector1">
             <a:avLst/>
@@ -18562,11 +18656,11 @@
           <a:lstStyle/>
           <a:p>
             <a:r>
-              <a:rPr lang="en-US" smtClean="0"/>
+              <a:rPr lang="en-US" dirty="0" smtClean="0"/>
               <a:t>XcalableMP</a:t>
             </a:r>
             <a:r>
-              <a:rPr lang="ja-JP" altLang="en-US" smtClean="0"/>
+              <a:rPr lang="ja-JP" altLang="en-US" dirty="0" smtClean="0"/>
               <a:t>講習会</a:t>
             </a:r>
             <a:endParaRPr lang="en-US" dirty="0"/>
@@ -18706,7 +18800,21 @@
                 <a:latin typeface="Consolas" pitchFamily="49" charset="0"/>
                 <a:cs typeface="Consolas" pitchFamily="49" charset="0"/>
               </a:rPr>
-              <a:t>with t(i-1)</a:t>
+              <a:t>with </a:t>
+            </a:r>
+            <a:r>
+              <a:rPr lang="en-US" altLang="ja-JP" sz="2000" dirty="0" smtClean="0">
+                <a:latin typeface="Consolas" pitchFamily="49" charset="0"/>
+                <a:cs typeface="Consolas" pitchFamily="49" charset="0"/>
+              </a:rPr>
+              <a:t>t[i-1</a:t>
+            </a:r>
+            <a:r>
+              <a:rPr lang="en-US" altLang="ja-JP" sz="2000" dirty="0">
+                <a:latin typeface="Consolas" pitchFamily="49" charset="0"/>
+                <a:cs typeface="Consolas" pitchFamily="49" charset="0"/>
+              </a:rPr>
+              <a:t>]</a:t>
             </a:r>
             <a:endParaRPr lang="ja-JP" altLang="en-US" sz="2000" dirty="0">
               <a:latin typeface="Consolas" pitchFamily="49" charset="0"/>
@@ -19160,7 +19268,7 @@
         <p:spPr bwMode="auto">
           <a:xfrm>
             <a:off x="2411760" y="4797152"/>
-            <a:ext cx="5686172" cy="400110"/>
+            <a:ext cx="5827236" cy="400110"/>
           </a:xfrm>
           <a:prstGeom prst="rect">
             <a:avLst/>
@@ -19258,7 +19366,14 @@
                 <a:latin typeface="Consolas" pitchFamily="49" charset="0"/>
                 <a:cs typeface="Consolas" pitchFamily="49" charset="0"/>
               </a:rPr>
-              <a:t>t(i-1,j)</a:t>
+              <a:t>t[i-1][j</a:t>
+            </a:r>
+            <a:r>
+              <a:rPr lang="en-US" altLang="ja-JP" sz="2000" dirty="0">
+                <a:latin typeface="Consolas" pitchFamily="49" charset="0"/>
+                <a:cs typeface="Consolas" pitchFamily="49" charset="0"/>
+              </a:rPr>
+              <a:t>]</a:t>
             </a:r>
             <a:endParaRPr lang="ja-JP" altLang="en-US" sz="2000" dirty="0">
               <a:latin typeface="Consolas" pitchFamily="49" charset="0"/>
@@ -21227,7 +21342,7 @@
                 <a:latin typeface="Consolas" panose="020B0609020204030204" pitchFamily="49" charset="0"/>
                 <a:cs typeface="Consolas" panose="020B0609020204030204" pitchFamily="49" charset="0"/>
               </a:rPr>
-              <a:t> nodes p(4)</a:t>
+              <a:t> nodes p[4]</a:t>
             </a:r>
           </a:p>
           <a:p>
@@ -21250,7 +21365,7 @@
                 <a:latin typeface="Consolas" panose="020B0609020204030204" pitchFamily="49" charset="0"/>
                 <a:cs typeface="Consolas" panose="020B0609020204030204" pitchFamily="49" charset="0"/>
               </a:rPr>
-              <a:t> template t(0:7)</a:t>
+              <a:t> template t[8]</a:t>
             </a:r>
           </a:p>
           <a:p>
@@ -21273,15 +21388,29 @@
                 <a:latin typeface="Consolas" panose="020B0609020204030204" pitchFamily="49" charset="0"/>
                 <a:cs typeface="Consolas" panose="020B0609020204030204" pitchFamily="49" charset="0"/>
               </a:rPr>
-              <a:t> distribute t(block) onto p</a:t>
-            </a:r>
-          </a:p>
-          <a:p>
+              <a:t> distribute t[block</a:t>
+            </a:r>
+            <a:r>
+              <a:rPr kumimoji="1" lang="en-US" altLang="ja-JP" dirty="0">
+                <a:latin typeface="Consolas" panose="020B0609020204030204" pitchFamily="49" charset="0"/>
+                <a:cs typeface="Consolas" panose="020B0609020204030204" pitchFamily="49" charset="0"/>
+              </a:rPr>
+              <a:t>]</a:t>
+            </a:r>
             <a:r>
               <a:rPr kumimoji="1" lang="en-US" altLang="ja-JP" dirty="0" smtClean="0">
                 <a:latin typeface="Consolas" panose="020B0609020204030204" pitchFamily="49" charset="0"/>
                 <a:cs typeface="Consolas" panose="020B0609020204030204" pitchFamily="49" charset="0"/>
               </a:rPr>
+              <a:t> onto p</a:t>
+            </a:r>
+          </a:p>
+          <a:p>
+            <a:r>
+              <a:rPr kumimoji="1" lang="en-US" altLang="ja-JP" dirty="0" smtClean="0">
+                <a:latin typeface="Consolas" panose="020B0609020204030204" pitchFamily="49" charset="0"/>
+                <a:cs typeface="Consolas" panose="020B0609020204030204" pitchFamily="49" charset="0"/>
+              </a:rPr>
               <a:t>float a[8];</a:t>
             </a:r>
           </a:p>
@@ -21319,7 +21448,7 @@
                 <a:latin typeface="Consolas" panose="020B0609020204030204" pitchFamily="49" charset="0"/>
                 <a:cs typeface="Consolas" panose="020B0609020204030204" pitchFamily="49" charset="0"/>
               </a:rPr>
-              <a:t>] with t(</a:t>
+              <a:t>] with t[</a:t>
             </a:r>
             <a:r>
               <a:rPr kumimoji="1" lang="en-US" altLang="ja-JP" dirty="0" err="1" smtClean="0">
@@ -21329,11 +21458,11 @@
               <a:t>i</a:t>
             </a:r>
             <a:r>
-              <a:rPr kumimoji="1" lang="en-US" altLang="ja-JP" dirty="0" smtClean="0">
-                <a:latin typeface="Consolas" panose="020B0609020204030204" pitchFamily="49" charset="0"/>
-                <a:cs typeface="Consolas" panose="020B0609020204030204" pitchFamily="49" charset="0"/>
-              </a:rPr>
-              <a:t>)</a:t>
+              <a:rPr kumimoji="1" lang="en-US" altLang="ja-JP" dirty="0">
+                <a:latin typeface="Consolas" panose="020B0609020204030204" pitchFamily="49" charset="0"/>
+                <a:cs typeface="Consolas" panose="020B0609020204030204" pitchFamily="49" charset="0"/>
+              </a:rPr>
+              <a:t>]</a:t>
             </a:r>
             <a:endParaRPr kumimoji="1" lang="ja-JP" altLang="en-US" dirty="0">
               <a:latin typeface="Consolas" panose="020B0609020204030204" pitchFamily="49" charset="0"/>
@@ -22050,7 +22179,7 @@
                 <a:latin typeface="Consolas" panose="020B0609020204030204" pitchFamily="49" charset="0"/>
                 <a:cs typeface="Consolas" panose="020B0609020204030204" pitchFamily="49" charset="0"/>
               </a:rPr>
-              <a:t> distribute t(block) onto p1</a:t>
+              <a:t> distribute t[block] onto p1</a:t>
             </a:r>
           </a:p>
           <a:p>
@@ -22110,7 +22239,7 @@
                 <a:latin typeface="Consolas" panose="020B0609020204030204" pitchFamily="49" charset="0"/>
                 <a:cs typeface="Consolas" panose="020B0609020204030204" pitchFamily="49" charset="0"/>
               </a:rPr>
-              <a:t> with t(</a:t>
+              <a:t> with t[</a:t>
             </a:r>
             <a:r>
               <a:rPr kumimoji="1" lang="en-US" altLang="ja-JP" sz="1600" dirty="0" err="1" smtClean="0">
@@ -22120,12 +22249,16 @@
               <a:t>i</a:t>
             </a:r>
             <a:r>
-              <a:rPr kumimoji="1" lang="en-US" altLang="ja-JP" sz="1600" dirty="0" smtClean="0">
-                <a:latin typeface="Consolas" panose="020B0609020204030204" pitchFamily="49" charset="0"/>
-                <a:cs typeface="Consolas" panose="020B0609020204030204" pitchFamily="49" charset="0"/>
-              </a:rPr>
-              <a:t>)</a:t>
-            </a:r>
+              <a:rPr kumimoji="1" lang="en-US" altLang="ja-JP" sz="1600" dirty="0">
+                <a:latin typeface="Consolas" panose="020B0609020204030204" pitchFamily="49" charset="0"/>
+                <a:cs typeface="Consolas" panose="020B0609020204030204" pitchFamily="49" charset="0"/>
+              </a:rPr>
+              <a:t>]</a:t>
+            </a:r>
+            <a:endParaRPr kumimoji="1" lang="en-US" altLang="ja-JP" sz="1600" dirty="0" smtClean="0">
+              <a:latin typeface="Consolas" panose="020B0609020204030204" pitchFamily="49" charset="0"/>
+              <a:cs typeface="Consolas" panose="020B0609020204030204" pitchFamily="49" charset="0"/>
+            </a:endParaRPr>
           </a:p>
         </p:txBody>
       </p:sp>
@@ -22974,7 +23107,7 @@
         <p:spPr>
           <a:xfrm>
             <a:off x="3275856" y="3933056"/>
-            <a:ext cx="5234125" cy="584775"/>
+            <a:ext cx="5346335" cy="584775"/>
           </a:xfrm>
           <a:prstGeom prst="rect">
             <a:avLst/>
@@ -23013,88 +23146,88 @@
                 <a:latin typeface="Consolas" panose="020B0609020204030204" pitchFamily="49" charset="0"/>
                 <a:cs typeface="Consolas" panose="020B0609020204030204" pitchFamily="49" charset="0"/>
               </a:rPr>
-              <a:t> distribute t(</a:t>
+              <a:t> distribute t[block][block</a:t>
+            </a:r>
+            <a:r>
+              <a:rPr kumimoji="1" lang="en-US" altLang="ja-JP" sz="1600" dirty="0">
+                <a:latin typeface="Consolas" panose="020B0609020204030204" pitchFamily="49" charset="0"/>
+                <a:cs typeface="Consolas" panose="020B0609020204030204" pitchFamily="49" charset="0"/>
+              </a:rPr>
+              <a:t>]</a:t>
+            </a:r>
+            <a:r>
+              <a:rPr kumimoji="1" lang="en-US" altLang="ja-JP" sz="1600" dirty="0" smtClean="0">
+                <a:latin typeface="Consolas" panose="020B0609020204030204" pitchFamily="49" charset="0"/>
+                <a:cs typeface="Consolas" panose="020B0609020204030204" pitchFamily="49" charset="0"/>
+              </a:rPr>
+              <a:t> onto p2</a:t>
+            </a:r>
+          </a:p>
+          <a:p>
+            <a:r>
+              <a:rPr kumimoji="1" lang="en-US" altLang="ja-JP" sz="1600" dirty="0" smtClean="0">
+                <a:latin typeface="Consolas" panose="020B0609020204030204" pitchFamily="49" charset="0"/>
+                <a:cs typeface="Consolas" panose="020B0609020204030204" pitchFamily="49" charset="0"/>
+              </a:rPr>
+              <a:t>#pragma </a:t>
             </a:r>
             <a:r>
               <a:rPr kumimoji="1" lang="en-US" altLang="ja-JP" sz="1600" dirty="0" err="1" smtClean="0">
                 <a:latin typeface="Consolas" panose="020B0609020204030204" pitchFamily="49" charset="0"/>
                 <a:cs typeface="Consolas" panose="020B0609020204030204" pitchFamily="49" charset="0"/>
               </a:rPr>
-              <a:t>block,block</a:t>
+              <a:t>xmp</a:t>
             </a:r>
             <a:r>
               <a:rPr kumimoji="1" lang="en-US" altLang="ja-JP" sz="1600" dirty="0" smtClean="0">
                 <a:latin typeface="Consolas" panose="020B0609020204030204" pitchFamily="49" charset="0"/>
                 <a:cs typeface="Consolas" panose="020B0609020204030204" pitchFamily="49" charset="0"/>
               </a:rPr>
-              <a:t>) onto p2</a:t>
-            </a:r>
-          </a:p>
-          <a:p>
+              <a:t> align a[</a:t>
+            </a:r>
+            <a:r>
+              <a:rPr kumimoji="1" lang="en-US" altLang="ja-JP" sz="1600" dirty="0" err="1" smtClean="0">
+                <a:latin typeface="Consolas" panose="020B0609020204030204" pitchFamily="49" charset="0"/>
+                <a:cs typeface="Consolas" panose="020B0609020204030204" pitchFamily="49" charset="0"/>
+              </a:rPr>
+              <a:t>i</a:t>
+            </a:r>
             <a:r>
               <a:rPr kumimoji="1" lang="en-US" altLang="ja-JP" sz="1600" dirty="0" smtClean="0">
                 <a:latin typeface="Consolas" panose="020B0609020204030204" pitchFamily="49" charset="0"/>
                 <a:cs typeface="Consolas" panose="020B0609020204030204" pitchFamily="49" charset="0"/>
               </a:rPr>
-              <a:t>#pragma </a:t>
+              <a:t>] with t</a:t>
+            </a:r>
+            <a:r>
+              <a:rPr kumimoji="1" lang="en-US" altLang="ja-JP" sz="1600" dirty="0" smtClean="0">
+                <a:solidFill>
+                  <a:srgbClr val="FF0000"/>
+                </a:solidFill>
+                <a:latin typeface="Consolas" panose="020B0609020204030204" pitchFamily="49" charset="0"/>
+                <a:cs typeface="Consolas" panose="020B0609020204030204" pitchFamily="49" charset="0"/>
+              </a:rPr>
+              <a:t>[</a:t>
             </a:r>
             <a:r>
               <a:rPr kumimoji="1" lang="en-US" altLang="ja-JP" sz="1600" dirty="0" err="1" smtClean="0">
-                <a:latin typeface="Consolas" panose="020B0609020204030204" pitchFamily="49" charset="0"/>
-                <a:cs typeface="Consolas" panose="020B0609020204030204" pitchFamily="49" charset="0"/>
-              </a:rPr>
-              <a:t>xmp</a:t>
+                <a:solidFill>
+                  <a:srgbClr val="FF0000"/>
+                </a:solidFill>
+                <a:latin typeface="Consolas" panose="020B0609020204030204" pitchFamily="49" charset="0"/>
+                <a:cs typeface="Consolas" panose="020B0609020204030204" pitchFamily="49" charset="0"/>
+              </a:rPr>
+              <a:t>i</a:t>
             </a:r>
             <a:r>
               <a:rPr kumimoji="1" lang="en-US" altLang="ja-JP" sz="1600" dirty="0" smtClean="0">
-                <a:latin typeface="Consolas" panose="020B0609020204030204" pitchFamily="49" charset="0"/>
-                <a:cs typeface="Consolas" panose="020B0609020204030204" pitchFamily="49" charset="0"/>
-              </a:rPr>
-              <a:t> align a[</a:t>
-            </a:r>
-            <a:r>
-              <a:rPr kumimoji="1" lang="en-US" altLang="ja-JP" sz="1600" dirty="0" err="1" smtClean="0">
-                <a:latin typeface="Consolas" panose="020B0609020204030204" pitchFamily="49" charset="0"/>
-                <a:cs typeface="Consolas" panose="020B0609020204030204" pitchFamily="49" charset="0"/>
-              </a:rPr>
-              <a:t>i</a:t>
-            </a:r>
-            <a:r>
-              <a:rPr kumimoji="1" lang="en-US" altLang="ja-JP" sz="1600" dirty="0" smtClean="0">
-                <a:latin typeface="Consolas" panose="020B0609020204030204" pitchFamily="49" charset="0"/>
-                <a:cs typeface="Consolas" panose="020B0609020204030204" pitchFamily="49" charset="0"/>
-              </a:rPr>
-              <a:t>] with t</a:t>
-            </a:r>
-            <a:r>
-              <a:rPr kumimoji="1" lang="en-US" altLang="ja-JP" sz="1600" dirty="0" smtClean="0">
                 <a:solidFill>
                   <a:srgbClr val="FF0000"/>
                 </a:solidFill>
                 <a:latin typeface="Consolas" panose="020B0609020204030204" pitchFamily="49" charset="0"/>
                 <a:cs typeface="Consolas" panose="020B0609020204030204" pitchFamily="49" charset="0"/>
               </a:rPr>
-              <a:t>(</a:t>
-            </a:r>
-            <a:r>
-              <a:rPr kumimoji="1" lang="en-US" altLang="ja-JP" sz="1600" dirty="0" err="1" smtClean="0">
-                <a:solidFill>
-                  <a:srgbClr val="FF0000"/>
-                </a:solidFill>
-                <a:latin typeface="Consolas" panose="020B0609020204030204" pitchFamily="49" charset="0"/>
-                <a:cs typeface="Consolas" panose="020B0609020204030204" pitchFamily="49" charset="0"/>
-              </a:rPr>
-              <a:t>i</a:t>
-            </a:r>
-            <a:r>
-              <a:rPr kumimoji="1" lang="en-US" altLang="ja-JP" sz="1600" dirty="0" smtClean="0">
-                <a:solidFill>
-                  <a:srgbClr val="FF0000"/>
-                </a:solidFill>
-                <a:latin typeface="Consolas" panose="020B0609020204030204" pitchFamily="49" charset="0"/>
-                <a:cs typeface="Consolas" panose="020B0609020204030204" pitchFamily="49" charset="0"/>
-              </a:rPr>
-              <a:t>,*)</a:t>
+              <a:t>][*]</a:t>
             </a:r>
           </a:p>
         </p:txBody>
@@ -23507,7 +23640,21 @@
                 <a:latin typeface="Consolas" panose="020B0609020204030204" pitchFamily="49" charset="0"/>
                 <a:cs typeface="Consolas" panose="020B0609020204030204" pitchFamily="49" charset="0"/>
               </a:rPr>
-              <a:t>p2(1,1)</a:t>
+              <a:t>p2[0][</a:t>
+            </a:r>
+            <a:r>
+              <a:rPr kumimoji="1" lang="en-US" altLang="ja-JP" sz="1600" dirty="0">
+                <a:latin typeface="Consolas" panose="020B0609020204030204" pitchFamily="49" charset="0"/>
+                <a:cs typeface="Consolas" panose="020B0609020204030204" pitchFamily="49" charset="0"/>
+              </a:rPr>
+              <a:t>0</a:t>
+            </a:r>
+            <a:r>
+              <a:rPr kumimoji="1" lang="en-US" altLang="ja-JP" sz="1600" dirty="0" smtClean="0">
+                <a:latin typeface="Consolas" panose="020B0609020204030204" pitchFamily="49" charset="0"/>
+                <a:cs typeface="Consolas" panose="020B0609020204030204" pitchFamily="49" charset="0"/>
+              </a:rPr>
+              <a:t>]</a:t>
             </a:r>
             <a:r>
               <a:rPr kumimoji="1" lang="ja-JP" altLang="en-US" sz="1600" dirty="0" smtClean="0"/>
@@ -23518,7 +23665,21 @@
                 <a:latin typeface="Consolas" panose="020B0609020204030204" pitchFamily="49" charset="0"/>
                 <a:cs typeface="Consolas" panose="020B0609020204030204" pitchFamily="49" charset="0"/>
               </a:rPr>
-              <a:t>p2(1,2)</a:t>
+              <a:t>p2[0][</a:t>
+            </a:r>
+            <a:r>
+              <a:rPr kumimoji="1" lang="en-US" altLang="ja-JP" sz="1600" dirty="0">
+                <a:latin typeface="Consolas" panose="020B0609020204030204" pitchFamily="49" charset="0"/>
+                <a:cs typeface="Consolas" panose="020B0609020204030204" pitchFamily="49" charset="0"/>
+              </a:rPr>
+              <a:t>1</a:t>
+            </a:r>
+            <a:r>
+              <a:rPr kumimoji="1" lang="en-US" altLang="ja-JP" sz="1600" dirty="0" smtClean="0">
+                <a:latin typeface="Consolas" panose="020B0609020204030204" pitchFamily="49" charset="0"/>
+                <a:cs typeface="Consolas" panose="020B0609020204030204" pitchFamily="49" charset="0"/>
+              </a:rPr>
+              <a:t>]</a:t>
             </a:r>
             <a:r>
               <a:rPr kumimoji="1" lang="ja-JP" altLang="en-US" sz="1600" dirty="0" smtClean="0"/>
@@ -23807,7 +23968,7 @@
                 <a:latin typeface="Consolas" pitchFamily="49" charset="0"/>
                 <a:cs typeface="Consolas" pitchFamily="49" charset="0"/>
               </a:rPr>
-              <a:t>][j] </a:t>
+              <a:t>] </a:t>
             </a:r>
             <a:r>
               <a:rPr lang="en-US" altLang="ja-JP" dirty="0">
@@ -23821,8 +23982,26 @@
                 <a:latin typeface="Consolas" pitchFamily="49" charset="0"/>
                 <a:cs typeface="Consolas" pitchFamily="49" charset="0"/>
               </a:rPr>
-              <a:t>t(i-1,j)</a:t>
-            </a:r>
+              <a:t>t[</a:t>
+            </a:r>
+            <a:r>
+              <a:rPr lang="en-US" altLang="ja-JP" dirty="0" err="1" smtClean="0">
+                <a:latin typeface="Consolas" pitchFamily="49" charset="0"/>
+                <a:cs typeface="Consolas" pitchFamily="49" charset="0"/>
+              </a:rPr>
+              <a:t>i</a:t>
+            </a:r>
+            <a:r>
+              <a:rPr lang="en-US" altLang="ja-JP" dirty="0" smtClean="0">
+                <a:latin typeface="Consolas" pitchFamily="49" charset="0"/>
+                <a:cs typeface="Consolas" pitchFamily="49" charset="0"/>
+              </a:rPr>
+              <a:t>]</a:t>
+            </a:r>
+            <a:endParaRPr lang="en-US" altLang="ja-JP" dirty="0" smtClean="0">
+              <a:latin typeface="Consolas" pitchFamily="49" charset="0"/>
+              <a:cs typeface="Consolas" pitchFamily="49" charset="0"/>
+            </a:endParaRPr>
           </a:p>
           <a:p>
             <a:r>
@@ -23970,7 +24149,7 @@
                 <a:latin typeface="Consolas" pitchFamily="49" charset="0"/>
                 <a:cs typeface="Consolas" pitchFamily="49" charset="0"/>
               </a:rPr>
-              <a:t>i,j</a:t>
+              <a:t>i</a:t>
             </a:r>
             <a:r>
               <a:rPr lang="en-US" altLang="ja-JP" dirty="0" smtClean="0">
@@ -23991,8 +24170,26 @@
                 <a:latin typeface="Consolas" pitchFamily="49" charset="0"/>
                 <a:cs typeface="Consolas" pitchFamily="49" charset="0"/>
               </a:rPr>
-              <a:t>t(i-1,j)</a:t>
-            </a:r>
+              <a:t>t(</a:t>
+            </a:r>
+            <a:r>
+              <a:rPr lang="en-US" altLang="ja-JP" dirty="0" err="1" smtClean="0">
+                <a:latin typeface="Consolas" pitchFamily="49" charset="0"/>
+                <a:cs typeface="Consolas" pitchFamily="49" charset="0"/>
+              </a:rPr>
+              <a:t>i</a:t>
+            </a:r>
+            <a:r>
+              <a:rPr lang="en-US" altLang="ja-JP" dirty="0" smtClean="0">
+                <a:latin typeface="Consolas" pitchFamily="49" charset="0"/>
+                <a:cs typeface="Consolas" pitchFamily="49" charset="0"/>
+              </a:rPr>
+              <a:t>)</a:t>
+            </a:r>
+            <a:endParaRPr lang="en-US" altLang="ja-JP" dirty="0" smtClean="0">
+              <a:latin typeface="Consolas" pitchFamily="49" charset="0"/>
+              <a:cs typeface="Consolas" pitchFamily="49" charset="0"/>
+            </a:endParaRPr>
           </a:p>
           <a:p>
             <a:r>
@@ -24202,21 +24399,28 @@
                 <a:latin typeface="Consolas" pitchFamily="49" charset="0"/>
                 <a:cs typeface="Consolas" pitchFamily="49" charset="0"/>
               </a:rPr>
-              <a:t>t(</a:t>
+              <a:t>t[</a:t>
             </a:r>
             <a:r>
               <a:rPr lang="en-US" altLang="ja-JP" dirty="0" err="1" smtClean="0">
                 <a:latin typeface="Consolas" pitchFamily="49" charset="0"/>
                 <a:cs typeface="Consolas" pitchFamily="49" charset="0"/>
               </a:rPr>
-              <a:t>i,j</a:t>
+              <a:t>i</a:t>
             </a:r>
             <a:r>
               <a:rPr lang="en-US" altLang="ja-JP" dirty="0" smtClean="0">
                 <a:latin typeface="Consolas" pitchFamily="49" charset="0"/>
                 <a:cs typeface="Consolas" pitchFamily="49" charset="0"/>
               </a:rPr>
-              <a:t>)</a:t>
+              <a:t>][j</a:t>
+            </a:r>
+            <a:r>
+              <a:rPr lang="en-US" altLang="ja-JP" dirty="0">
+                <a:latin typeface="Consolas" pitchFamily="49" charset="0"/>
+                <a:cs typeface="Consolas" pitchFamily="49" charset="0"/>
+              </a:rPr>
+              <a:t>]</a:t>
             </a:r>
             <a:r>
               <a:rPr lang="ja-JP" altLang="en-US" dirty="0" smtClean="0">
@@ -24255,14 +24459,14 @@
                 <a:latin typeface="Consolas" pitchFamily="49" charset="0"/>
                 <a:cs typeface="Consolas" pitchFamily="49" charset="0"/>
               </a:rPr>
-              <a:t>i,j</a:t>
+              <a:t>i</a:t>
             </a:r>
             <a:r>
               <a:rPr lang="en-US" altLang="ja-JP" dirty="0" smtClean="0">
                 <a:latin typeface="Consolas" pitchFamily="49" charset="0"/>
                 <a:cs typeface="Consolas" pitchFamily="49" charset="0"/>
               </a:rPr>
-              <a:t>]</a:t>
+              <a:t>][j]</a:t>
             </a:r>
             <a:r>
               <a:rPr lang="ja-JP" altLang="en-US" dirty="0" err="1">
@@ -24327,11 +24531,11 @@
           <a:lstStyle/>
           <a:p>
             <a:r>
-              <a:rPr lang="en-US" smtClean="0"/>
+              <a:rPr lang="en-US" dirty="0" smtClean="0"/>
               <a:t>XcalableMP</a:t>
             </a:r>
             <a:r>
-              <a:rPr lang="ja-JP" altLang="en-US" smtClean="0"/>
+              <a:rPr lang="ja-JP" altLang="en-US" dirty="0" smtClean="0"/>
               <a:t>講習会</a:t>
             </a:r>
             <a:endParaRPr lang="en-US" dirty="0"/>
@@ -24373,7 +24577,7 @@
         <p:spPr bwMode="auto">
           <a:xfrm>
             <a:off x="2555776" y="3645024"/>
-            <a:ext cx="4698722" cy="1323439"/>
+            <a:ext cx="4839786" cy="1323439"/>
           </a:xfrm>
           <a:prstGeom prst="rect">
             <a:avLst/>
@@ -24444,7 +24648,7 @@
                 <a:latin typeface="Consolas" pitchFamily="49" charset="0"/>
                 <a:cs typeface="Consolas" pitchFamily="49" charset="0"/>
               </a:rPr>
-              <a:t>) on t(</a:t>
+              <a:t>) on t[</a:t>
             </a:r>
             <a:r>
               <a:rPr lang="en-US" altLang="ja-JP" sz="2000" dirty="0" err="1" smtClean="0">
@@ -24454,7 +24658,7 @@
                 <a:latin typeface="Consolas" pitchFamily="49" charset="0"/>
                 <a:cs typeface="Consolas" pitchFamily="49" charset="0"/>
               </a:rPr>
-              <a:t>i,j</a:t>
+              <a:t>i</a:t>
             </a:r>
             <a:r>
               <a:rPr lang="en-US" altLang="ja-JP" sz="2000" dirty="0" smtClean="0">
@@ -24464,7 +24668,119 @@
                 <a:latin typeface="Consolas" pitchFamily="49" charset="0"/>
                 <a:cs typeface="Consolas" pitchFamily="49" charset="0"/>
               </a:rPr>
-              <a:t>)</a:t>
+              <a:t>][j</a:t>
+            </a:r>
+            <a:r>
+              <a:rPr lang="en-US" altLang="ja-JP" sz="2000" dirty="0">
+                <a:solidFill>
+                  <a:srgbClr val="FF0000"/>
+                </a:solidFill>
+                <a:latin typeface="Consolas" pitchFamily="49" charset="0"/>
+                <a:cs typeface="Consolas" pitchFamily="49" charset="0"/>
+              </a:rPr>
+              <a:t>]</a:t>
+            </a:r>
+          </a:p>
+          <a:p>
+            <a:r>
+              <a:rPr lang="en-US" altLang="ja-JP" sz="2000" dirty="0" smtClean="0">
+                <a:latin typeface="Consolas" pitchFamily="49" charset="0"/>
+                <a:cs typeface="Consolas" pitchFamily="49" charset="0"/>
+              </a:rPr>
+              <a:t>for (</a:t>
+            </a:r>
+            <a:r>
+              <a:rPr lang="en-US" altLang="ja-JP" sz="2000" dirty="0" err="1" smtClean="0">
+                <a:latin typeface="Consolas" pitchFamily="49" charset="0"/>
+                <a:cs typeface="Consolas" pitchFamily="49" charset="0"/>
+              </a:rPr>
+              <a:t>i</a:t>
+            </a:r>
+            <a:r>
+              <a:rPr lang="en-US" altLang="ja-JP" sz="2000" dirty="0" smtClean="0">
+                <a:latin typeface="Consolas" pitchFamily="49" charset="0"/>
+                <a:cs typeface="Consolas" pitchFamily="49" charset="0"/>
+              </a:rPr>
+              <a:t> = 0; </a:t>
+            </a:r>
+            <a:r>
+              <a:rPr lang="en-US" altLang="ja-JP" sz="2000" dirty="0" err="1" smtClean="0">
+                <a:latin typeface="Consolas" pitchFamily="49" charset="0"/>
+                <a:cs typeface="Consolas" pitchFamily="49" charset="0"/>
+              </a:rPr>
+              <a:t>i</a:t>
+            </a:r>
+            <a:r>
+              <a:rPr lang="en-US" altLang="ja-JP" sz="2000" dirty="0" smtClean="0">
+                <a:latin typeface="Consolas" pitchFamily="49" charset="0"/>
+                <a:cs typeface="Consolas" pitchFamily="49" charset="0"/>
+              </a:rPr>
+              <a:t> &lt; n; </a:t>
+            </a:r>
+            <a:r>
+              <a:rPr lang="en-US" altLang="ja-JP" sz="2000" dirty="0" err="1" smtClean="0">
+                <a:latin typeface="Consolas" pitchFamily="49" charset="0"/>
+                <a:cs typeface="Consolas" pitchFamily="49" charset="0"/>
+              </a:rPr>
+              <a:t>i</a:t>
+            </a:r>
+            <a:r>
+              <a:rPr lang="en-US" altLang="ja-JP" sz="2000" dirty="0" smtClean="0">
+                <a:latin typeface="Consolas" pitchFamily="49" charset="0"/>
+                <a:cs typeface="Consolas" pitchFamily="49" charset="0"/>
+              </a:rPr>
+              <a:t>++)</a:t>
+            </a:r>
+          </a:p>
+          <a:p>
+            <a:r>
+              <a:rPr lang="en-US" altLang="ja-JP" sz="2000" dirty="0" smtClean="0">
+                <a:latin typeface="Consolas" pitchFamily="49" charset="0"/>
+                <a:cs typeface="Consolas" pitchFamily="49" charset="0"/>
+              </a:rPr>
+              <a:t>  for (</a:t>
+            </a:r>
+            <a:r>
+              <a:rPr lang="en-US" altLang="ja-JP" sz="2000" dirty="0">
+                <a:latin typeface="Consolas" pitchFamily="49" charset="0"/>
+                <a:cs typeface="Consolas" pitchFamily="49" charset="0"/>
+              </a:rPr>
+              <a:t>j</a:t>
+            </a:r>
+            <a:r>
+              <a:rPr lang="en-US" altLang="ja-JP" sz="2000" dirty="0" smtClean="0">
+                <a:latin typeface="Consolas" pitchFamily="49" charset="0"/>
+                <a:cs typeface="Consolas" pitchFamily="49" charset="0"/>
+              </a:rPr>
+              <a:t> = 0; </a:t>
+            </a:r>
+            <a:r>
+              <a:rPr lang="en-US" altLang="ja-JP" sz="2000" dirty="0">
+                <a:latin typeface="Consolas" pitchFamily="49" charset="0"/>
+                <a:cs typeface="Consolas" pitchFamily="49" charset="0"/>
+              </a:rPr>
+              <a:t>j</a:t>
+            </a:r>
+            <a:r>
+              <a:rPr lang="en-US" altLang="ja-JP" sz="2000" dirty="0" smtClean="0">
+                <a:latin typeface="Consolas" pitchFamily="49" charset="0"/>
+                <a:cs typeface="Consolas" pitchFamily="49" charset="0"/>
+              </a:rPr>
+              <a:t> &lt; n; </a:t>
+            </a:r>
+            <a:r>
+              <a:rPr lang="en-US" altLang="ja-JP" sz="2000" dirty="0">
+                <a:latin typeface="Consolas" pitchFamily="49" charset="0"/>
+                <a:cs typeface="Consolas" pitchFamily="49" charset="0"/>
+              </a:rPr>
+              <a:t>j</a:t>
+            </a:r>
+            <a:r>
+              <a:rPr lang="en-US" altLang="ja-JP" sz="2000" dirty="0" smtClean="0">
+                <a:latin typeface="Consolas" pitchFamily="49" charset="0"/>
+                <a:cs typeface="Consolas" pitchFamily="49" charset="0"/>
+              </a:rPr>
+              <a:t>++)</a:t>
             </a:r>
             <a:endParaRPr lang="en-US" altLang="ja-JP" sz="2000" dirty="0">
               <a:solidFill>
@@ -24476,127 +24792,18 @@
           </a:p>
           <a:p>
             <a:r>
+              <a:rPr lang="en-US" altLang="ja-JP" sz="2000" dirty="0">
+                <a:latin typeface="Consolas" pitchFamily="49" charset="0"/>
+                <a:cs typeface="Consolas" pitchFamily="49" charset="0"/>
+              </a:rPr>
+              <a:t>  </a:t>
+            </a:r>
+            <a:r>
               <a:rPr lang="en-US" altLang="ja-JP" sz="2000" dirty="0" smtClean="0">
                 <a:latin typeface="Consolas" pitchFamily="49" charset="0"/>
                 <a:cs typeface="Consolas" pitchFamily="49" charset="0"/>
               </a:rPr>
-              <a:t>for (</a:t>
-            </a:r>
-            <a:r>
-              <a:rPr lang="en-US" altLang="ja-JP" sz="2000" dirty="0" err="1" smtClean="0">
-                <a:latin typeface="Consolas" pitchFamily="49" charset="0"/>
-                <a:cs typeface="Consolas" pitchFamily="49" charset="0"/>
-              </a:rPr>
-              <a:t>i</a:t>
-            </a:r>
-            <a:r>
-              <a:rPr lang="en-US" altLang="ja-JP" sz="2000" dirty="0" smtClean="0">
-                <a:latin typeface="Consolas" pitchFamily="49" charset="0"/>
-                <a:cs typeface="Consolas" pitchFamily="49" charset="0"/>
-              </a:rPr>
-              <a:t> = 0; </a:t>
-            </a:r>
-            <a:r>
-              <a:rPr lang="en-US" altLang="ja-JP" sz="2000" dirty="0" err="1" smtClean="0">
-                <a:latin typeface="Consolas" pitchFamily="49" charset="0"/>
-                <a:cs typeface="Consolas" pitchFamily="49" charset="0"/>
-              </a:rPr>
-              <a:t>i</a:t>
-            </a:r>
-            <a:r>
-              <a:rPr lang="en-US" altLang="ja-JP" sz="2000" dirty="0" smtClean="0">
-                <a:latin typeface="Consolas" pitchFamily="49" charset="0"/>
-                <a:cs typeface="Consolas" pitchFamily="49" charset="0"/>
-              </a:rPr>
-              <a:t> &lt; n; </a:t>
-            </a:r>
-            <a:r>
-              <a:rPr lang="en-US" altLang="ja-JP" sz="2000" dirty="0" err="1" smtClean="0">
-                <a:latin typeface="Consolas" pitchFamily="49" charset="0"/>
-                <a:cs typeface="Consolas" pitchFamily="49" charset="0"/>
-              </a:rPr>
-              <a:t>i</a:t>
-            </a:r>
-            <a:r>
-              <a:rPr lang="en-US" altLang="ja-JP" sz="2000" dirty="0" smtClean="0">
-                <a:latin typeface="Consolas" pitchFamily="49" charset="0"/>
-                <a:cs typeface="Consolas" pitchFamily="49" charset="0"/>
-              </a:rPr>
-              <a:t>++)</a:t>
-            </a:r>
-          </a:p>
-          <a:p>
-            <a:r>
-              <a:rPr lang="en-US" altLang="ja-JP" sz="2000" dirty="0" smtClean="0">
-                <a:latin typeface="Consolas" pitchFamily="49" charset="0"/>
-                <a:cs typeface="Consolas" pitchFamily="49" charset="0"/>
-              </a:rPr>
-              <a:t>for (</a:t>
-            </a:r>
-            <a:r>
-              <a:rPr lang="en-US" altLang="ja-JP" sz="2000" dirty="0">
-                <a:latin typeface="Consolas" pitchFamily="49" charset="0"/>
-                <a:cs typeface="Consolas" pitchFamily="49" charset="0"/>
-              </a:rPr>
-              <a:t>j</a:t>
-            </a:r>
-            <a:r>
-              <a:rPr lang="en-US" altLang="ja-JP" sz="2000" dirty="0" smtClean="0">
-                <a:latin typeface="Consolas" pitchFamily="49" charset="0"/>
-                <a:cs typeface="Consolas" pitchFamily="49" charset="0"/>
-              </a:rPr>
-              <a:t> = 0; </a:t>
-            </a:r>
-            <a:r>
-              <a:rPr lang="en-US" altLang="ja-JP" sz="2000" dirty="0">
-                <a:latin typeface="Consolas" pitchFamily="49" charset="0"/>
-                <a:cs typeface="Consolas" pitchFamily="49" charset="0"/>
-              </a:rPr>
-              <a:t>j</a:t>
-            </a:r>
-            <a:r>
-              <a:rPr lang="en-US" altLang="ja-JP" sz="2000" dirty="0" smtClean="0">
-                <a:latin typeface="Consolas" pitchFamily="49" charset="0"/>
-                <a:cs typeface="Consolas" pitchFamily="49" charset="0"/>
-              </a:rPr>
-              <a:t> &lt; n; </a:t>
-            </a:r>
-            <a:r>
-              <a:rPr lang="en-US" altLang="ja-JP" sz="2000" dirty="0">
-                <a:latin typeface="Consolas" pitchFamily="49" charset="0"/>
-                <a:cs typeface="Consolas" pitchFamily="49" charset="0"/>
-              </a:rPr>
-              <a:t>j</a:t>
-            </a:r>
-            <a:r>
-              <a:rPr lang="en-US" altLang="ja-JP" sz="2000" dirty="0" smtClean="0">
-                <a:latin typeface="Consolas" pitchFamily="49" charset="0"/>
-                <a:cs typeface="Consolas" pitchFamily="49" charset="0"/>
-              </a:rPr>
-              <a:t>++)</a:t>
-            </a:r>
-            <a:endParaRPr lang="en-US" altLang="ja-JP" sz="2000" dirty="0">
-              <a:solidFill>
-                <a:srgbClr val="FF0000"/>
-              </a:solidFill>
-              <a:latin typeface="Consolas" pitchFamily="49" charset="0"/>
-              <a:cs typeface="Consolas" pitchFamily="49" charset="0"/>
-            </a:endParaRPr>
-          </a:p>
-          <a:p>
-            <a:r>
-              <a:rPr lang="en-US" altLang="ja-JP" sz="2000" dirty="0">
-                <a:latin typeface="Consolas" pitchFamily="49" charset="0"/>
-                <a:cs typeface="Consolas" pitchFamily="49" charset="0"/>
-              </a:rPr>
-              <a:t>   </a:t>
-            </a:r>
-            <a:r>
-              <a:rPr lang="en-US" altLang="ja-JP" sz="2000" dirty="0" smtClean="0">
-                <a:latin typeface="Consolas" pitchFamily="49" charset="0"/>
-                <a:cs typeface="Consolas" pitchFamily="49" charset="0"/>
-              </a:rPr>
-              <a:t>a[</a:t>
+              <a:t>  a[</a:t>
             </a:r>
             <a:r>
               <a:rPr lang="en-US" altLang="ja-JP" sz="2000" dirty="0" err="1" smtClean="0">
@@ -24748,27 +24955,40 @@
                 <a:latin typeface="Consolas" pitchFamily="49" charset="0"/>
                 <a:cs typeface="Consolas" pitchFamily="49" charset="0"/>
               </a:rPr>
-              <a:t>t(</a:t>
+              <a:t>t[</a:t>
             </a:r>
             <a:r>
               <a:rPr lang="en-US" altLang="ja-JP" dirty="0" err="1" smtClean="0">
                 <a:latin typeface="Consolas" pitchFamily="49" charset="0"/>
                 <a:cs typeface="Consolas" pitchFamily="49" charset="0"/>
               </a:rPr>
-              <a:t>i,j</a:t>
+              <a:t>i</a:t>
             </a:r>
             <a:r>
               <a:rPr lang="en-US" altLang="ja-JP" dirty="0" smtClean="0">
                 <a:latin typeface="Consolas" pitchFamily="49" charset="0"/>
                 <a:cs typeface="Consolas" pitchFamily="49" charset="0"/>
               </a:rPr>
-              <a:t>)</a:t>
+              <a:t>][j</a:t>
+            </a:r>
+            <a:r>
+              <a:rPr lang="en-US" altLang="ja-JP" dirty="0">
+                <a:latin typeface="Consolas" pitchFamily="49" charset="0"/>
+                <a:cs typeface="Consolas" pitchFamily="49" charset="0"/>
+              </a:rPr>
+              <a:t>]</a:t>
+            </a:r>
+            <a:r>
+              <a:rPr lang="ja-JP" altLang="en-US" dirty="0" smtClean="0">
+                <a:latin typeface="+mn-ea"/>
+              </a:rPr>
+              <a:t>を</a:t>
             </a:r>
             <a:r>
               <a:rPr lang="ja-JP" altLang="en-US" dirty="0">
                 <a:latin typeface="+mn-ea"/>
               </a:rPr>
-              <a:t>を持つノードが、</a:t>
+              <a:t>持つノードが、</a:t>
             </a:r>
             <a:r>
               <a:rPr lang="en-US" altLang="ja-JP" dirty="0">
@@ -24912,7 +25132,7 @@
         <p:spPr bwMode="auto">
           <a:xfrm>
             <a:off x="2555776" y="4509120"/>
-            <a:ext cx="4698722" cy="1323439"/>
+            <a:ext cx="4839786" cy="1323439"/>
           </a:xfrm>
           <a:prstGeom prst="rect">
             <a:avLst/>
@@ -24983,7 +25203,7 @@
                 <a:latin typeface="Consolas" pitchFamily="49" charset="0"/>
                 <a:cs typeface="Consolas" pitchFamily="49" charset="0"/>
               </a:rPr>
-              <a:t>) on t(</a:t>
+              <a:t>) on t[</a:t>
             </a:r>
             <a:r>
               <a:rPr lang="en-US" altLang="ja-JP" sz="2000" dirty="0" err="1" smtClean="0">
@@ -24993,7 +25213,7 @@
                 <a:latin typeface="Consolas" pitchFamily="49" charset="0"/>
                 <a:cs typeface="Consolas" pitchFamily="49" charset="0"/>
               </a:rPr>
-              <a:t>i,j</a:t>
+              <a:t>i</a:t>
             </a:r>
             <a:r>
               <a:rPr lang="en-US" altLang="ja-JP" sz="2000" dirty="0" smtClean="0">
@@ -25003,7 +25223,119 @@
                 <a:latin typeface="Consolas" pitchFamily="49" charset="0"/>
                 <a:cs typeface="Consolas" pitchFamily="49" charset="0"/>
               </a:rPr>
-              <a:t>)</a:t>
+              <a:t>][j</a:t>
+            </a:r>
+            <a:r>
+              <a:rPr lang="en-US" altLang="ja-JP" sz="2000" dirty="0">
+                <a:solidFill>
+                  <a:srgbClr val="FF0000"/>
+                </a:solidFill>
+                <a:latin typeface="Consolas" pitchFamily="49" charset="0"/>
+                <a:cs typeface="Consolas" pitchFamily="49" charset="0"/>
+              </a:rPr>
+              <a:t>]</a:t>
+            </a:r>
+          </a:p>
+          <a:p>
+            <a:r>
+              <a:rPr lang="en-US" altLang="ja-JP" sz="2000" dirty="0" smtClean="0">
+                <a:latin typeface="Consolas" pitchFamily="49" charset="0"/>
+                <a:cs typeface="Consolas" pitchFamily="49" charset="0"/>
+              </a:rPr>
+              <a:t>for (</a:t>
+            </a:r>
+            <a:r>
+              <a:rPr lang="en-US" altLang="ja-JP" sz="2000" dirty="0" err="1" smtClean="0">
+                <a:latin typeface="Consolas" pitchFamily="49" charset="0"/>
+                <a:cs typeface="Consolas" pitchFamily="49" charset="0"/>
+              </a:rPr>
+              <a:t>i</a:t>
+            </a:r>
+            <a:r>
+              <a:rPr lang="en-US" altLang="ja-JP" sz="2000" dirty="0" smtClean="0">
+                <a:latin typeface="Consolas" pitchFamily="49" charset="0"/>
+                <a:cs typeface="Consolas" pitchFamily="49" charset="0"/>
+              </a:rPr>
+              <a:t> = 0; </a:t>
+            </a:r>
+            <a:r>
+              <a:rPr lang="en-US" altLang="ja-JP" sz="2000" dirty="0" err="1" smtClean="0">
+                <a:latin typeface="Consolas" pitchFamily="49" charset="0"/>
+                <a:cs typeface="Consolas" pitchFamily="49" charset="0"/>
+              </a:rPr>
+              <a:t>i</a:t>
+            </a:r>
+            <a:r>
+              <a:rPr lang="en-US" altLang="ja-JP" sz="2000" dirty="0" smtClean="0">
+                <a:latin typeface="Consolas" pitchFamily="49" charset="0"/>
+                <a:cs typeface="Consolas" pitchFamily="49" charset="0"/>
+              </a:rPr>
+              <a:t> &lt; n; </a:t>
+            </a:r>
+            <a:r>
+              <a:rPr lang="en-US" altLang="ja-JP" sz="2000" dirty="0" err="1" smtClean="0">
+                <a:latin typeface="Consolas" pitchFamily="49" charset="0"/>
+                <a:cs typeface="Consolas" pitchFamily="49" charset="0"/>
+              </a:rPr>
+              <a:t>i</a:t>
+            </a:r>
+            <a:r>
+              <a:rPr lang="en-US" altLang="ja-JP" sz="2000" dirty="0" smtClean="0">
+                <a:latin typeface="Consolas" pitchFamily="49" charset="0"/>
+                <a:cs typeface="Consolas" pitchFamily="49" charset="0"/>
+              </a:rPr>
+              <a:t>++)</a:t>
+            </a:r>
+          </a:p>
+          <a:p>
+            <a:r>
+              <a:rPr lang="en-US" altLang="ja-JP" sz="2000" dirty="0" smtClean="0">
+                <a:latin typeface="Consolas" pitchFamily="49" charset="0"/>
+                <a:cs typeface="Consolas" pitchFamily="49" charset="0"/>
+              </a:rPr>
+              <a:t>  for (</a:t>
+            </a:r>
+            <a:r>
+              <a:rPr lang="en-US" altLang="ja-JP" sz="2000" dirty="0">
+                <a:latin typeface="Consolas" pitchFamily="49" charset="0"/>
+                <a:cs typeface="Consolas" pitchFamily="49" charset="0"/>
+              </a:rPr>
+              <a:t>j</a:t>
+            </a:r>
+            <a:r>
+              <a:rPr lang="en-US" altLang="ja-JP" sz="2000" dirty="0" smtClean="0">
+                <a:latin typeface="Consolas" pitchFamily="49" charset="0"/>
+                <a:cs typeface="Consolas" pitchFamily="49" charset="0"/>
+              </a:rPr>
+              <a:t> = 0; </a:t>
+            </a:r>
+            <a:r>
+              <a:rPr lang="en-US" altLang="ja-JP" sz="2000" dirty="0">
+                <a:latin typeface="Consolas" pitchFamily="49" charset="0"/>
+                <a:cs typeface="Consolas" pitchFamily="49" charset="0"/>
+              </a:rPr>
+              <a:t>j</a:t>
+            </a:r>
+            <a:r>
+              <a:rPr lang="en-US" altLang="ja-JP" sz="2000" dirty="0" smtClean="0">
+                <a:latin typeface="Consolas" pitchFamily="49" charset="0"/>
+                <a:cs typeface="Consolas" pitchFamily="49" charset="0"/>
+              </a:rPr>
+              <a:t> &lt; n; </a:t>
+            </a:r>
+            <a:r>
+              <a:rPr lang="en-US" altLang="ja-JP" sz="2000" dirty="0">
+                <a:latin typeface="Consolas" pitchFamily="49" charset="0"/>
+                <a:cs typeface="Consolas" pitchFamily="49" charset="0"/>
+              </a:rPr>
+              <a:t>j</a:t>
+            </a:r>
+            <a:r>
+              <a:rPr lang="en-US" altLang="ja-JP" sz="2000" dirty="0" smtClean="0">
+                <a:latin typeface="Consolas" pitchFamily="49" charset="0"/>
+                <a:cs typeface="Consolas" pitchFamily="49" charset="0"/>
+              </a:rPr>
+              <a:t>++)</a:t>
             </a:r>
             <a:endParaRPr lang="en-US" altLang="ja-JP" sz="2000" dirty="0">
               <a:solidFill>
@@ -25019,123 +25351,7 @@
                 <a:latin typeface="Consolas" pitchFamily="49" charset="0"/>
                 <a:cs typeface="Consolas" pitchFamily="49" charset="0"/>
               </a:rPr>
-              <a:t>for (</a:t>
-            </a:r>
-            <a:r>
-              <a:rPr lang="en-US" altLang="ja-JP" sz="2000" dirty="0" err="1" smtClean="0">
-                <a:latin typeface="Consolas" pitchFamily="49" charset="0"/>
-                <a:cs typeface="Consolas" pitchFamily="49" charset="0"/>
-              </a:rPr>
-              <a:t>i</a:t>
-            </a:r>
-            <a:r>
-              <a:rPr lang="en-US" altLang="ja-JP" sz="2000" dirty="0" smtClean="0">
-                <a:latin typeface="Consolas" pitchFamily="49" charset="0"/>
-                <a:cs typeface="Consolas" pitchFamily="49" charset="0"/>
-              </a:rPr>
-              <a:t> = 0; </a:t>
-            </a:r>
-            <a:r>
-              <a:rPr lang="en-US" altLang="ja-JP" sz="2000" dirty="0" err="1" smtClean="0">
-                <a:latin typeface="Consolas" pitchFamily="49" charset="0"/>
-                <a:cs typeface="Consolas" pitchFamily="49" charset="0"/>
-              </a:rPr>
-              <a:t>i</a:t>
-            </a:r>
-            <a:r>
-              <a:rPr lang="en-US" altLang="ja-JP" sz="2000" dirty="0" smtClean="0">
-                <a:latin typeface="Consolas" pitchFamily="49" charset="0"/>
-                <a:cs typeface="Consolas" pitchFamily="49" charset="0"/>
-              </a:rPr>
-              <a:t> &lt; n; </a:t>
-            </a:r>
-            <a:r>
-              <a:rPr lang="en-US" altLang="ja-JP" sz="2000" dirty="0" err="1" smtClean="0">
-                <a:latin typeface="Consolas" pitchFamily="49" charset="0"/>
-                <a:cs typeface="Consolas" pitchFamily="49" charset="0"/>
-              </a:rPr>
-              <a:t>i</a:t>
-            </a:r>
-            <a:r>
-              <a:rPr lang="en-US" altLang="ja-JP" sz="2000" dirty="0" smtClean="0">
-                <a:latin typeface="Consolas" pitchFamily="49" charset="0"/>
-                <a:cs typeface="Consolas" pitchFamily="49" charset="0"/>
-              </a:rPr>
-              <a:t>++)</a:t>
-            </a:r>
-          </a:p>
-          <a:p>
-            <a:r>
-              <a:rPr lang="en-US" altLang="ja-JP" sz="2000" dirty="0" smtClean="0">
-                <a:latin typeface="Consolas" pitchFamily="49" charset="0"/>
-                <a:cs typeface="Consolas" pitchFamily="49" charset="0"/>
-              </a:rPr>
-              <a:t>for (</a:t>
-            </a:r>
-            <a:r>
-              <a:rPr lang="en-US" altLang="ja-JP" sz="2000" dirty="0">
-                <a:latin typeface="Consolas" pitchFamily="49" charset="0"/>
-                <a:cs typeface="Consolas" pitchFamily="49" charset="0"/>
-              </a:rPr>
-              <a:t>j</a:t>
-            </a:r>
-            <a:r>
-              <a:rPr lang="en-US" altLang="ja-JP" sz="2000" dirty="0" smtClean="0">
-                <a:latin typeface="Consolas" pitchFamily="49" charset="0"/>
-                <a:cs typeface="Consolas" pitchFamily="49" charset="0"/>
-              </a:rPr>
-              <a:t> = 0; </a:t>
-            </a:r>
-            <a:r>
-              <a:rPr lang="en-US" altLang="ja-JP" sz="2000" dirty="0">
-                <a:latin typeface="Consolas" pitchFamily="49" charset="0"/>
-                <a:cs typeface="Consolas" pitchFamily="49" charset="0"/>
-              </a:rPr>
-              <a:t>j</a:t>
-            </a:r>
-            <a:r>
-              <a:rPr lang="en-US" altLang="ja-JP" sz="2000" dirty="0" smtClean="0">
-                <a:latin typeface="Consolas" pitchFamily="49" charset="0"/>
-                <a:cs typeface="Consolas" pitchFamily="49" charset="0"/>
-              </a:rPr>
-              <a:t> &lt; n; </a:t>
-            </a:r>
-            <a:r>
-              <a:rPr lang="en-US" altLang="ja-JP" sz="2000" dirty="0">
-                <a:latin typeface="Consolas" pitchFamily="49" charset="0"/>
-                <a:cs typeface="Consolas" pitchFamily="49" charset="0"/>
-              </a:rPr>
-              <a:t>j</a:t>
-            </a:r>
-            <a:r>
-              <a:rPr lang="en-US" altLang="ja-JP" sz="2000" dirty="0" smtClean="0">
-                <a:latin typeface="Consolas" pitchFamily="49" charset="0"/>
-                <a:cs typeface="Consolas" pitchFamily="49" charset="0"/>
-              </a:rPr>
-              <a:t>++)</a:t>
-            </a:r>
-            <a:endParaRPr lang="en-US" altLang="ja-JP" sz="2000" dirty="0">
-              <a:solidFill>
-                <a:srgbClr val="FF0000"/>
-              </a:solidFill>
-              <a:latin typeface="Consolas" pitchFamily="49" charset="0"/>
-              <a:cs typeface="Consolas" pitchFamily="49" charset="0"/>
-            </a:endParaRPr>
-          </a:p>
-          <a:p>
-            <a:r>
-              <a:rPr lang="en-US" altLang="ja-JP" sz="2000" dirty="0">
-                <a:latin typeface="Consolas" pitchFamily="49" charset="0"/>
-                <a:cs typeface="Consolas" pitchFamily="49" charset="0"/>
-              </a:rPr>
-              <a:t>   </a:t>
-            </a:r>
-            <a:r>
-              <a:rPr lang="en-US" altLang="ja-JP" sz="2000" dirty="0" smtClean="0">
-                <a:latin typeface="Consolas" pitchFamily="49" charset="0"/>
-                <a:cs typeface="Consolas" pitchFamily="49" charset="0"/>
-              </a:rPr>
-              <a:t>a[</a:t>
+              <a:t>    a[</a:t>
             </a:r>
             <a:r>
               <a:rPr lang="en-US" altLang="ja-JP" sz="2000" dirty="0" err="1" smtClean="0">
@@ -25595,7 +25811,7 @@
                 <a:cs typeface="Consolas" panose="020B0609020204030204" pitchFamily="49" charset="0"/>
                 <a:sym typeface="Arial" panose="020B0604020202020204" pitchFamily="34" charset="0"/>
               </a:rPr>
-              <a:t> loop </a:t>
+              <a:t> </a:t>
             </a:r>
             <a:r>
               <a:rPr kumimoji="0" lang="en-US" altLang="ja-JP" sz="1800" dirty="0" smtClean="0">
@@ -25607,7 +25823,19 @@
                 <a:cs typeface="Consolas" panose="020B0609020204030204" pitchFamily="49" charset="0"/>
                 <a:sym typeface="Arial" panose="020B0604020202020204" pitchFamily="34" charset="0"/>
               </a:rPr>
-              <a:t>(</a:t>
+              <a:t>loop </a:t>
+            </a:r>
+            <a:r>
+              <a:rPr kumimoji="0" lang="en-US" altLang="ja-JP" sz="1800" dirty="0" smtClean="0">
+                <a:solidFill>
+                  <a:schemeClr val="tx1"/>
+                </a:solidFill>
+                <a:latin typeface="Consolas" panose="020B0609020204030204" pitchFamily="49" charset="0"/>
+                <a:ea typeface="ＭＳ Ｐゴシック" panose="020B0600070205080204" pitchFamily="50" charset="-128"/>
+                <a:cs typeface="Consolas" panose="020B0609020204030204" pitchFamily="49" charset="0"/>
+                <a:sym typeface="Arial" panose="020B0604020202020204" pitchFamily="34" charset="0"/>
+              </a:rPr>
+              <a:t>on t[</a:t>
             </a:r>
             <a:r>
               <a:rPr kumimoji="0" lang="en-US" altLang="ja-JP" sz="1800" dirty="0" err="1" smtClean="0">
@@ -25622,6 +25850,18 @@
               <a:t>i</a:t>
             </a:r>
             <a:r>
+              <a:rPr kumimoji="0" lang="en-US" altLang="ja-JP" sz="1800" dirty="0">
+                <a:solidFill>
+                  <a:schemeClr val="tx1"/>
+                </a:solidFill>
+                <a:latin typeface="Consolas" panose="020B0609020204030204" pitchFamily="49" charset="0"/>
+                <a:ea typeface="ＭＳ Ｐゴシック" panose="020B0600070205080204" pitchFamily="50" charset="-128"/>
+                <a:cs typeface="Consolas" panose="020B0609020204030204" pitchFamily="49" charset="0"/>
+                <a:sym typeface="Arial" panose="020B0604020202020204" pitchFamily="34" charset="0"/>
+              </a:rPr>
+              <a:t>]</a:t>
+            </a:r>
+            <a:r>
               <a:rPr kumimoji="0" lang="en-US" altLang="ja-JP" sz="1800" dirty="0" smtClean="0">
                 <a:solidFill>
                   <a:schemeClr val="tx1"/>
@@ -25631,43 +25871,7 @@
                 <a:cs typeface="Consolas" panose="020B0609020204030204" pitchFamily="49" charset="0"/>
                 <a:sym typeface="Arial" panose="020B0604020202020204" pitchFamily="34" charset="0"/>
               </a:rPr>
-              <a:t>) on </a:t>
-            </a:r>
-            <a:r>
-              <a:rPr kumimoji="0" lang="en-US" altLang="ja-JP" sz="1800" dirty="0">
-                <a:solidFill>
-                  <a:schemeClr val="tx1"/>
-                </a:solidFill>
-                <a:latin typeface="Consolas" panose="020B0609020204030204" pitchFamily="49" charset="0"/>
-                <a:ea typeface="ＭＳ Ｐゴシック" panose="020B0600070205080204" pitchFamily="50" charset="-128"/>
-                <a:cs typeface="Consolas" panose="020B0609020204030204" pitchFamily="49" charset="0"/>
-                <a:sym typeface="Arial" panose="020B0604020202020204" pitchFamily="34" charset="0"/>
-              </a:rPr>
-              <a:t>t(</a:t>
-            </a:r>
-            <a:r>
-              <a:rPr kumimoji="0" lang="en-US" altLang="ja-JP" sz="1800" dirty="0" err="1">
-                <a:solidFill>
-                  <a:schemeClr val="tx1"/>
-                </a:solidFill>
-                <a:latin typeface="Consolas" panose="020B0609020204030204" pitchFamily="49" charset="0"/>
-                <a:ea typeface="ＭＳ Ｐゴシック" panose="020B0600070205080204" pitchFamily="50" charset="-128"/>
-                <a:cs typeface="Consolas" panose="020B0609020204030204" pitchFamily="49" charset="0"/>
-                <a:sym typeface="Arial" panose="020B0604020202020204" pitchFamily="34" charset="0"/>
-              </a:rPr>
-              <a:t>i</a:t>
-            </a:r>
-            <a:r>
-              <a:rPr kumimoji="0" lang="en-US" altLang="ja-JP" sz="1800" dirty="0">
-                <a:solidFill>
-                  <a:schemeClr val="tx1"/>
-                </a:solidFill>
-                <a:latin typeface="Consolas" panose="020B0609020204030204" pitchFamily="49" charset="0"/>
-                <a:ea typeface="ＭＳ Ｐゴシック" panose="020B0600070205080204" pitchFamily="50" charset="-128"/>
-                <a:cs typeface="Consolas" panose="020B0609020204030204" pitchFamily="49" charset="0"/>
-                <a:sym typeface="Arial" panose="020B0604020202020204" pitchFamily="34" charset="0"/>
-              </a:rPr>
-              <a:t>) </a:t>
+              <a:t> </a:t>
             </a:r>
             <a:r>
               <a:rPr kumimoji="0" lang="en-US" altLang="ja-JP" sz="1800" dirty="0">
@@ -26461,7 +26665,7 @@
                 <a:cs typeface="Consolas" panose="020B0609020204030204" pitchFamily="49" charset="0"/>
                 <a:sym typeface="Arial" panose="020B0604020202020204" pitchFamily="34" charset="0"/>
               </a:rPr>
-              <a:t> task on p(1</a:t>
+              <a:t> task on </a:t>
             </a:r>
             <a:r>
               <a:rPr kumimoji="0" lang="en-US" altLang="ja-JP" sz="1969" dirty="0" smtClean="0">
@@ -26473,7 +26677,7 @@
                 <a:cs typeface="Consolas" panose="020B0609020204030204" pitchFamily="49" charset="0"/>
                 <a:sym typeface="Arial" panose="020B0604020202020204" pitchFamily="34" charset="0"/>
               </a:rPr>
-              <a:t>)</a:t>
+              <a:t>p[0]</a:t>
             </a:r>
           </a:p>
           <a:p>
@@ -26601,7 +26805,7 @@
                 <a:cs typeface="Consolas" panose="020B0609020204030204" pitchFamily="49" charset="0"/>
                 <a:sym typeface="Arial" panose="020B0604020202020204" pitchFamily="34" charset="0"/>
               </a:rPr>
-              <a:t> task on p(2</a:t>
+              <a:t> task on </a:t>
             </a:r>
             <a:r>
               <a:rPr kumimoji="0" lang="en-US" altLang="ja-JP" sz="1969" dirty="0" smtClean="0">
@@ -26613,7 +26817,7 @@
                 <a:cs typeface="Consolas" panose="020B0609020204030204" pitchFamily="49" charset="0"/>
                 <a:sym typeface="Arial" panose="020B0604020202020204" pitchFamily="34" charset="0"/>
               </a:rPr>
-              <a:t>)</a:t>
+              <a:t>p[1]</a:t>
             </a:r>
           </a:p>
           <a:p>
@@ -26711,7 +26915,7 @@
                 <a:latin typeface="Consolas" panose="020B0609020204030204" pitchFamily="49" charset="0"/>
                 <a:cs typeface="Consolas" panose="020B0609020204030204" pitchFamily="49" charset="0"/>
               </a:rPr>
-              <a:t>p(1)</a:t>
+              <a:t>P[0]</a:t>
             </a:r>
             <a:r>
               <a:rPr kumimoji="1" lang="ja-JP" altLang="en-US" dirty="0" smtClean="0">
@@ -26761,11 +26965,18 @@
           <a:lstStyle/>
           <a:p>
             <a:r>
+              <a:rPr kumimoji="1" lang="en-US" altLang="ja-JP" dirty="0">
+                <a:latin typeface="Consolas" panose="020B0609020204030204" pitchFamily="49" charset="0"/>
+                <a:cs typeface="Consolas" panose="020B0609020204030204" pitchFamily="49" charset="0"/>
+              </a:rPr>
+              <a:t>p</a:t>
+            </a:r>
+            <a:r>
               <a:rPr kumimoji="1" lang="en-US" altLang="ja-JP" dirty="0" smtClean="0">
                 <a:latin typeface="Consolas" panose="020B0609020204030204" pitchFamily="49" charset="0"/>
                 <a:cs typeface="Consolas" panose="020B0609020204030204" pitchFamily="49" charset="0"/>
               </a:rPr>
-              <a:t>p(2)</a:t>
+              <a:t>[1]</a:t>
             </a:r>
             <a:r>
               <a:rPr kumimoji="1" lang="ja-JP" altLang="en-US" dirty="0" smtClean="0">
@@ -27164,21 +27375,44 @@
                 <a:latin typeface="Consolas" panose="020B0609020204030204" pitchFamily="49" charset="0"/>
                 <a:cs typeface="Consolas" panose="020B0609020204030204" pitchFamily="49" charset="0"/>
               </a:rPr>
-              <a:t>#</a:t>
-            </a:r>
-            <a:r>
-              <a:rPr lang="en-US" altLang="ja-JP" sz="2000" dirty="0" err="1" smtClean="0">
-                <a:latin typeface="Consolas" panose="020B0609020204030204" pitchFamily="49" charset="0"/>
-                <a:cs typeface="Consolas" panose="020B0609020204030204" pitchFamily="49" charset="0"/>
-              </a:rPr>
-              <a:t>pragma</a:t>
-            </a:r>
+              <a:t>#pragma </a:t>
+            </a:r>
+            <a:r>
+              <a:rPr kumimoji="1" lang="en-US" altLang="ja-JP" sz="2000" dirty="0" err="1" smtClean="0">
+                <a:latin typeface="Consolas" panose="020B0609020204030204" pitchFamily="49" charset="0"/>
+                <a:cs typeface="Consolas" panose="020B0609020204030204" pitchFamily="49" charset="0"/>
+              </a:rPr>
+              <a:t>xmp</a:t>
+            </a:r>
+            <a:r>
+              <a:rPr kumimoji="1" lang="en-US" altLang="ja-JP" sz="2000" dirty="0" smtClean="0">
+                <a:latin typeface="Consolas" panose="020B0609020204030204" pitchFamily="49" charset="0"/>
+                <a:cs typeface="Consolas" panose="020B0609020204030204" pitchFamily="49" charset="0"/>
+              </a:rPr>
+              <a:t> distribute t[block</a:t>
+            </a:r>
+            <a:r>
+              <a:rPr kumimoji="1" lang="en-US" altLang="ja-JP" sz="2000" dirty="0">
+                <a:latin typeface="Consolas" panose="020B0609020204030204" pitchFamily="49" charset="0"/>
+                <a:cs typeface="Consolas" panose="020B0609020204030204" pitchFamily="49" charset="0"/>
+              </a:rPr>
+              <a:t>]</a:t>
+            </a:r>
+            <a:r>
+              <a:rPr kumimoji="1" lang="en-US" altLang="ja-JP" sz="2000" dirty="0" smtClean="0">
+                <a:latin typeface="Consolas" panose="020B0609020204030204" pitchFamily="49" charset="0"/>
+                <a:cs typeface="Consolas" panose="020B0609020204030204" pitchFamily="49" charset="0"/>
+              </a:rPr>
+              <a:t> onto p</a:t>
+            </a:r>
+          </a:p>
+          <a:p>
             <a:r>
               <a:rPr lang="en-US" altLang="ja-JP" sz="2000" dirty="0" smtClean="0">
                 <a:latin typeface="Consolas" panose="020B0609020204030204" pitchFamily="49" charset="0"/>
                 <a:cs typeface="Consolas" panose="020B0609020204030204" pitchFamily="49" charset="0"/>
               </a:rPr>
-              <a:t> </a:t>
+              <a:t>#pragma </a:t>
             </a:r>
             <a:r>
               <a:rPr kumimoji="1" lang="en-US" altLang="ja-JP" sz="2000" dirty="0" err="1" smtClean="0">
@@ -27192,66 +27426,54 @@
                 <a:latin typeface="Consolas" panose="020B0609020204030204" pitchFamily="49" charset="0"/>
                 <a:cs typeface="Consolas" panose="020B0609020204030204" pitchFamily="49" charset="0"/>
               </a:rPr>
-              <a:t> distribute t(block) onto p</a:t>
-            </a:r>
-          </a:p>
-          <a:p>
+              <a:t> align a[</a:t>
+            </a:r>
+            <a:r>
+              <a:rPr kumimoji="1" lang="en-US" altLang="ja-JP" sz="2000" dirty="0" err="1" smtClean="0">
+                <a:latin typeface="Consolas" panose="020B0609020204030204" pitchFamily="49" charset="0"/>
+                <a:cs typeface="Consolas" panose="020B0609020204030204" pitchFamily="49" charset="0"/>
+              </a:rPr>
+              <a:t>i</a:t>
+            </a:r>
             <a:r>
               <a:rPr lang="en-US" altLang="ja-JP" sz="2000" dirty="0" smtClean="0">
                 <a:latin typeface="Consolas" panose="020B0609020204030204" pitchFamily="49" charset="0"/>
                 <a:cs typeface="Consolas" panose="020B0609020204030204" pitchFamily="49" charset="0"/>
               </a:rPr>
-              <a:t>#</a:t>
-            </a:r>
-            <a:r>
-              <a:rPr lang="en-US" altLang="ja-JP" sz="2000" dirty="0" err="1" smtClean="0">
-                <a:latin typeface="Consolas" panose="020B0609020204030204" pitchFamily="49" charset="0"/>
-                <a:cs typeface="Consolas" panose="020B0609020204030204" pitchFamily="49" charset="0"/>
-              </a:rPr>
-              <a:t>pragma</a:t>
-            </a:r>
-            <a:r>
-              <a:rPr lang="en-US" altLang="ja-JP" sz="2000" dirty="0" smtClean="0">
-                <a:latin typeface="Consolas" panose="020B0609020204030204" pitchFamily="49" charset="0"/>
-                <a:cs typeface="Consolas" panose="020B0609020204030204" pitchFamily="49" charset="0"/>
-              </a:rPr>
-              <a:t> </a:t>
+              <a:t>]</a:t>
+            </a:r>
+            <a:r>
+              <a:rPr kumimoji="1" lang="en-US" altLang="ja-JP" sz="2000" dirty="0" smtClean="0">
+                <a:latin typeface="Consolas" panose="020B0609020204030204" pitchFamily="49" charset="0"/>
+                <a:cs typeface="Consolas" panose="020B0609020204030204" pitchFamily="49" charset="0"/>
+              </a:rPr>
+              <a:t> with </a:t>
+            </a:r>
+            <a:r>
+              <a:rPr kumimoji="1" lang="en-US" altLang="ja-JP" sz="2000" dirty="0" smtClean="0">
+                <a:latin typeface="Consolas" panose="020B0609020204030204" pitchFamily="49" charset="0"/>
+                <a:cs typeface="Consolas" panose="020B0609020204030204" pitchFamily="49" charset="0"/>
+              </a:rPr>
+              <a:t>t[</a:t>
             </a:r>
             <a:r>
               <a:rPr kumimoji="1" lang="en-US" altLang="ja-JP" sz="2000" dirty="0" err="1" smtClean="0">
                 <a:latin typeface="Consolas" panose="020B0609020204030204" pitchFamily="49" charset="0"/>
                 <a:cs typeface="Consolas" panose="020B0609020204030204" pitchFamily="49" charset="0"/>
               </a:rPr>
-              <a:t>xmp</a:t>
+              <a:t>i</a:t>
             </a:r>
             <a:r>
               <a:rPr kumimoji="1" lang="en-US" altLang="ja-JP" sz="2000" dirty="0" smtClean="0">
                 <a:latin typeface="Consolas" panose="020B0609020204030204" pitchFamily="49" charset="0"/>
                 <a:cs typeface="Consolas" panose="020B0609020204030204" pitchFamily="49" charset="0"/>
               </a:rPr>
-              <a:t> align a[</a:t>
-            </a:r>
-            <a:r>
-              <a:rPr kumimoji="1" lang="en-US" altLang="ja-JP" sz="2000" dirty="0" err="1" smtClean="0">
-                <a:latin typeface="Consolas" panose="020B0609020204030204" pitchFamily="49" charset="0"/>
-                <a:cs typeface="Consolas" panose="020B0609020204030204" pitchFamily="49" charset="0"/>
-              </a:rPr>
-              <a:t>i</a:t>
-            </a:r>
-            <a:r>
-              <a:rPr lang="en-US" altLang="ja-JP" sz="2000" dirty="0" smtClean="0">
-                <a:latin typeface="Consolas" panose="020B0609020204030204" pitchFamily="49" charset="0"/>
-                <a:cs typeface="Consolas" panose="020B0609020204030204" pitchFamily="49" charset="0"/>
-              </a:rPr>
               <a:t>]</a:t>
             </a:r>
-            <a:r>
-              <a:rPr kumimoji="1" lang="en-US" altLang="ja-JP" sz="2000" dirty="0" smtClean="0">
-                <a:latin typeface="Consolas" panose="020B0609020204030204" pitchFamily="49" charset="0"/>
-                <a:cs typeface="Consolas" panose="020B0609020204030204" pitchFamily="49" charset="0"/>
-              </a:rPr>
-              <a:t> with t(i-1)</a:t>
-            </a:r>
+            <a:endParaRPr kumimoji="1" lang="en-US" altLang="ja-JP" sz="2000" dirty="0" smtClean="0">
+              <a:latin typeface="Consolas" panose="020B0609020204030204" pitchFamily="49" charset="0"/>
+              <a:cs typeface="Consolas" panose="020B0609020204030204" pitchFamily="49" charset="0"/>
+            </a:endParaRPr>
           </a:p>
           <a:p>
             <a:r>
@@ -28977,15 +29199,24 @@
                 <a:cs typeface="Consolas" panose="020B0609020204030204" pitchFamily="49" charset="0"/>
                 <a:sym typeface="Arial" panose="020B0604020202020204" pitchFamily="34" charset="0"/>
               </a:rPr>
-              <a:t> loop on t(</a:t>
-            </a:r>
-            <a:r>
-              <a:rPr lang="en-US" altLang="ja-JP" sz="2000" dirty="0" err="1">
+              <a:t> loop on </a:t>
+            </a:r>
+            <a:r>
+              <a:rPr lang="en-US" altLang="ja-JP" sz="2000" dirty="0" smtClean="0">
                 <a:latin typeface="Consolas" panose="020B0609020204030204" pitchFamily="49" charset="0"/>
                 <a:ea typeface="ＭＳ Ｐゴシック" panose="020B0600070205080204" pitchFamily="50" charset="-128"/>
                 <a:cs typeface="Consolas" panose="020B0609020204030204" pitchFamily="49" charset="0"/>
                 <a:sym typeface="Arial" panose="020B0604020202020204" pitchFamily="34" charset="0"/>
               </a:rPr>
+              <a:t>t[</a:t>
+            </a:r>
+            <a:r>
+              <a:rPr lang="en-US" altLang="ja-JP" sz="2000" dirty="0" err="1" smtClean="0">
+                <a:latin typeface="Consolas" panose="020B0609020204030204" pitchFamily="49" charset="0"/>
+                <a:ea typeface="ＭＳ Ｐゴシック" panose="020B0600070205080204" pitchFamily="50" charset="-128"/>
+                <a:cs typeface="Consolas" panose="020B0609020204030204" pitchFamily="49" charset="0"/>
+                <a:sym typeface="Arial" panose="020B0604020202020204" pitchFamily="34" charset="0"/>
+              </a:rPr>
               <a:t>i</a:t>
             </a:r>
             <a:r>
@@ -28995,7 +29226,7 @@
                 <a:cs typeface="Consolas" panose="020B0609020204030204" pitchFamily="49" charset="0"/>
                 <a:sym typeface="Arial" panose="020B0604020202020204" pitchFamily="34" charset="0"/>
               </a:rPr>
-              <a:t>)</a:t>
+              <a:t>]</a:t>
             </a:r>
           </a:p>
           <a:p>
@@ -32375,15 +32606,24 @@
                 <a:cs typeface="Consolas" panose="020B0609020204030204" pitchFamily="49" charset="0"/>
                 <a:sym typeface="Arial" panose="020B0604020202020204" pitchFamily="34" charset="0"/>
               </a:rPr>
-              <a:t> loop on t(</a:t>
-            </a:r>
-            <a:r>
-              <a:rPr lang="en-US" altLang="ja-JP" sz="2000" dirty="0" err="1">
+              <a:t> loop on </a:t>
+            </a:r>
+            <a:r>
+              <a:rPr lang="en-US" altLang="ja-JP" sz="2000" dirty="0" smtClean="0">
                 <a:latin typeface="Consolas" panose="020B0609020204030204" pitchFamily="49" charset="0"/>
                 <a:ea typeface="ＭＳ Ｐゴシック" panose="020B0600070205080204" pitchFamily="50" charset="-128"/>
                 <a:cs typeface="Consolas" panose="020B0609020204030204" pitchFamily="49" charset="0"/>
                 <a:sym typeface="Arial" panose="020B0604020202020204" pitchFamily="34" charset="0"/>
               </a:rPr>
+              <a:t>t[</a:t>
+            </a:r>
+            <a:r>
+              <a:rPr lang="en-US" altLang="ja-JP" sz="2000" dirty="0" err="1" smtClean="0">
+                <a:latin typeface="Consolas" panose="020B0609020204030204" pitchFamily="49" charset="0"/>
+                <a:ea typeface="ＭＳ Ｐゴシック" panose="020B0600070205080204" pitchFamily="50" charset="-128"/>
+                <a:cs typeface="Consolas" panose="020B0609020204030204" pitchFamily="49" charset="0"/>
+                <a:sym typeface="Arial" panose="020B0604020202020204" pitchFamily="34" charset="0"/>
+              </a:rPr>
               <a:t>i</a:t>
             </a:r>
             <a:r>
@@ -32393,7 +32633,7 @@
                 <a:cs typeface="Consolas" panose="020B0609020204030204" pitchFamily="49" charset="0"/>
                 <a:sym typeface="Arial" panose="020B0604020202020204" pitchFamily="34" charset="0"/>
               </a:rPr>
-              <a:t>)</a:t>
+              <a:t>]</a:t>
             </a:r>
           </a:p>
           <a:p>
@@ -37331,7 +37571,7 @@
                 <a:latin typeface="Consolas" panose="020B0609020204030204" pitchFamily="49" charset="0"/>
                 <a:cs typeface="Consolas" panose="020B0609020204030204" pitchFamily="49" charset="0"/>
               </a:rPr>
-              <a:t> (s) from p(1)</a:t>
+              <a:t> (s) from p[0]</a:t>
             </a:r>
             <a:endParaRPr kumimoji="1" lang="ja-JP" altLang="en-US" dirty="0">
               <a:latin typeface="Consolas" panose="020B0609020204030204" pitchFamily="49" charset="0"/>
@@ -37434,7 +37674,7 @@
                 <a:latin typeface="Consolas" panose="020B0609020204030204" pitchFamily="49" charset="0"/>
                 <a:cs typeface="Consolas" panose="020B0609020204030204" pitchFamily="49" charset="0"/>
               </a:rPr>
-              <a:t>from p(1)</a:t>
+              <a:t>from p[0]</a:t>
             </a:r>
           </a:p>
           <a:p>
@@ -39697,8 +39937,8 @@
         </p:nvSpPr>
         <p:spPr bwMode="auto">
           <a:xfrm>
-            <a:off x="1403648" y="4078813"/>
-            <a:ext cx="3697386" cy="1321594"/>
+            <a:off x="1096206" y="4078813"/>
+            <a:ext cx="4004828" cy="1321594"/>
           </a:xfrm>
           <a:prstGeom prst="rect">
             <a:avLst/>
@@ -39910,7 +40150,7 @@
               <a:t>(</a:t>
             </a:r>
             <a:r>
-              <a:rPr kumimoji="0" lang="en-US" altLang="ja-JP" sz="1969" dirty="0" err="1">
+              <a:rPr kumimoji="0" lang="en-US" altLang="ja-JP" sz="1969" dirty="0" err="1" smtClean="0">
                 <a:solidFill>
                   <a:schemeClr val="tx1"/>
                 </a:solidFill>
@@ -39918,7 +40158,18 @@
                 <a:cs typeface="Consolas" panose="020B0609020204030204" pitchFamily="49" charset="0"/>
                 <a:sym typeface="Arial" panose="020B0604020202020204" pitchFamily="34" charset="0"/>
               </a:rPr>
-              <a:t>xmp_node_num</a:t>
+              <a:t>xmpc_this_image</a:t>
+            </a:r>
+            <a:r>
+              <a:rPr kumimoji="0" lang="en-US" altLang="ja-JP" sz="1969" dirty="0" smtClean="0">
+                <a:solidFill>
+                  <a:schemeClr val="tx1"/>
+                </a:solidFill>
+                <a:latin typeface="Consolas" panose="020B0609020204030204" pitchFamily="49" charset="0"/>
+                <a:cs typeface="Consolas" panose="020B0609020204030204" pitchFamily="49" charset="0"/>
+                <a:sym typeface="Arial" panose="020B0604020202020204" pitchFamily="34" charset="0"/>
+              </a:rPr>
+              <a:t>() </a:t>
             </a:r>
             <a:r>
               <a:rPr kumimoji="0" lang="en-US" altLang="ja-JP" sz="1969" dirty="0">
@@ -39929,8 +40180,27 @@
                 <a:cs typeface="Consolas" panose="020B0609020204030204" pitchFamily="49" charset="0"/>
                 <a:sym typeface="Arial" panose="020B0604020202020204" pitchFamily="34" charset="0"/>
               </a:rPr>
-              <a:t>() == 1)</a:t>
-            </a:r>
+              <a:t>== </a:t>
+            </a:r>
+            <a:r>
+              <a:rPr kumimoji="0" lang="en-US" altLang="ja-JP" sz="1969" dirty="0" smtClean="0">
+                <a:solidFill>
+                  <a:schemeClr val="tx1"/>
+                </a:solidFill>
+                <a:latin typeface="Consolas" panose="020B0609020204030204" pitchFamily="49" charset="0"/>
+                <a:cs typeface="Consolas" panose="020B0609020204030204" pitchFamily="49" charset="0"/>
+                <a:sym typeface="Arial" panose="020B0604020202020204" pitchFamily="34" charset="0"/>
+              </a:rPr>
+              <a:t>0)</a:t>
+            </a:r>
+            <a:endParaRPr kumimoji="0" lang="en-US" altLang="ja-JP" sz="1969" dirty="0">
+              <a:solidFill>
+                <a:schemeClr val="tx1"/>
+              </a:solidFill>
+              <a:latin typeface="Consolas" panose="020B0609020204030204" pitchFamily="49" charset="0"/>
+              <a:cs typeface="Consolas" panose="020B0609020204030204" pitchFamily="49" charset="0"/>
+              <a:sym typeface="Arial" panose="020B0604020202020204" pitchFamily="34" charset="0"/>
+            </a:endParaRPr>
           </a:p>
           <a:p>
             <a:pPr algn="l"/>
@@ -39944,10 +40214,22 @@
                 <a:cs typeface="Consolas" panose="020B0609020204030204" pitchFamily="49" charset="0"/>
                 <a:sym typeface="Arial" panose="020B0604020202020204" pitchFamily="34" charset="0"/>
               </a:rPr>
-              <a:t>  a[0:3] = b[3:3]</a:t>
-            </a:r>
-            <a:r>
-              <a:rPr kumimoji="0" lang="en-US" altLang="ja-JP" sz="1969" dirty="0">
+              <a:t>  a[0:3] = b[3:3</a:t>
+            </a:r>
+            <a:r>
+              <a:rPr kumimoji="0" lang="en-US" altLang="ja-JP" sz="1969" dirty="0" smtClean="0">
+                <a:solidFill>
+                  <a:schemeClr val="tx1"/>
+                </a:solidFill>
+                <a:latin typeface="Consolas" panose="020B0609020204030204" pitchFamily="49" charset="0"/>
+                <a:ea typeface="ＭＳ Ｐゴシック" panose="020B0600070205080204" pitchFamily="50" charset="-128"/>
+                <a:cs typeface="Consolas" panose="020B0609020204030204" pitchFamily="49" charset="0"/>
+                <a:sym typeface="Arial" panose="020B0604020202020204" pitchFamily="34" charset="0"/>
+              </a:rPr>
+              <a:t>]</a:t>
+            </a:r>
+            <a:r>
+              <a:rPr kumimoji="0" lang="en-US" altLang="ja-JP" sz="1969" dirty="0" smtClean="0">
                 <a:solidFill>
                   <a:srgbClr val="FF0000"/>
                 </a:solidFill>
@@ -39956,8 +40238,17 @@
                 <a:cs typeface="Consolas" panose="020B0609020204030204" pitchFamily="49" charset="0"/>
                 <a:sym typeface="Arial" panose="020B0604020202020204" pitchFamily="34" charset="0"/>
               </a:rPr>
-              <a:t>:[2];</a:t>
-            </a:r>
+              <a:t>:[1];</a:t>
+            </a:r>
+            <a:endParaRPr kumimoji="0" lang="en-US" altLang="ja-JP" sz="1969" dirty="0">
+              <a:solidFill>
+                <a:srgbClr val="FF0000"/>
+              </a:solidFill>
+              <a:latin typeface="Consolas" panose="020B0609020204030204" pitchFamily="49" charset="0"/>
+              <a:ea typeface="ＭＳ Ｐゴシック" panose="020B0600070205080204" pitchFamily="50" charset="-128"/>
+              <a:cs typeface="Consolas" panose="020B0609020204030204" pitchFamily="49" charset="0"/>
+              <a:sym typeface="Arial" panose="020B0604020202020204" pitchFamily="34" charset="0"/>
+            </a:endParaRPr>
           </a:p>
         </p:txBody>
       </p:sp>
@@ -42671,8 +42962,29 @@
                 <a:cs typeface="Consolas" panose="020B0609020204030204" pitchFamily="49" charset="0"/>
                 <a:sym typeface="Arial" panose="020B0604020202020204" pitchFamily="34" charset="0"/>
               </a:rPr>
-              <a:t> nodes p(*)</a:t>
-            </a:r>
+              <a:t> nodes </a:t>
+            </a:r>
+            <a:r>
+              <a:rPr lang="en-US" altLang="ja-JP" sz="1200" dirty="0" smtClean="0">
+                <a:solidFill>
+                  <a:srgbClr val="FF0000"/>
+                </a:solidFill>
+                <a:latin typeface="Consolas" panose="020B0609020204030204" pitchFamily="49" charset="0"/>
+                <a:ea typeface="ＭＳ Ｐゴシック" panose="020B0600070205080204" pitchFamily="50" charset="-128"/>
+                <a:cs typeface="Consolas" panose="020B0609020204030204" pitchFamily="49" charset="0"/>
+                <a:sym typeface="Arial" panose="020B0604020202020204" pitchFamily="34" charset="0"/>
+              </a:rPr>
+              <a:t>p[*]</a:t>
+            </a:r>
+            <a:endParaRPr lang="en-US" altLang="ja-JP" sz="1200" dirty="0">
+              <a:solidFill>
+                <a:srgbClr val="FF0000"/>
+              </a:solidFill>
+              <a:latin typeface="Consolas" panose="020B0609020204030204" pitchFamily="49" charset="0"/>
+              <a:ea typeface="ＭＳ Ｐゴシック" panose="020B0600070205080204" pitchFamily="50" charset="-128"/>
+              <a:cs typeface="Consolas" panose="020B0609020204030204" pitchFamily="49" charset="0"/>
+              <a:sym typeface="Arial" panose="020B0604020202020204" pitchFamily="34" charset="0"/>
+            </a:endParaRPr>
           </a:p>
           <a:p>
             <a:pPr>
@@ -42714,8 +43026,29 @@
                 <a:cs typeface="Consolas" panose="020B0609020204030204" pitchFamily="49" charset="0"/>
                 <a:sym typeface="Arial" panose="020B0604020202020204" pitchFamily="34" charset="0"/>
               </a:rPr>
-              <a:t> template t(0:MAX-1)</a:t>
-            </a:r>
+              <a:t> template </a:t>
+            </a:r>
+            <a:r>
+              <a:rPr lang="en-US" altLang="ja-JP" sz="1200" dirty="0" smtClean="0">
+                <a:solidFill>
+                  <a:srgbClr val="FF0000"/>
+                </a:solidFill>
+                <a:latin typeface="Consolas" panose="020B0609020204030204" pitchFamily="49" charset="0"/>
+                <a:ea typeface="ＭＳ Ｐゴシック" panose="020B0600070205080204" pitchFamily="50" charset="-128"/>
+                <a:cs typeface="Consolas" panose="020B0609020204030204" pitchFamily="49" charset="0"/>
+                <a:sym typeface="Arial" panose="020B0604020202020204" pitchFamily="34" charset="0"/>
+              </a:rPr>
+              <a:t>t[MAX]</a:t>
+            </a:r>
+            <a:endParaRPr lang="en-US" altLang="ja-JP" sz="1200" dirty="0">
+              <a:solidFill>
+                <a:srgbClr val="FF0000"/>
+              </a:solidFill>
+              <a:latin typeface="Consolas" panose="020B0609020204030204" pitchFamily="49" charset="0"/>
+              <a:ea typeface="ＭＳ Ｐゴシック" panose="020B0600070205080204" pitchFamily="50" charset="-128"/>
+              <a:cs typeface="Consolas" panose="020B0609020204030204" pitchFamily="49" charset="0"/>
+              <a:sym typeface="Arial" panose="020B0604020202020204" pitchFamily="34" charset="0"/>
+            </a:endParaRPr>
           </a:p>
           <a:p>
             <a:pPr>
@@ -42757,7 +43090,55 @@
                 <a:cs typeface="Consolas" panose="020B0609020204030204" pitchFamily="49" charset="0"/>
                 <a:sym typeface="Arial" panose="020B0604020202020204" pitchFamily="34" charset="0"/>
               </a:rPr>
-              <a:t> distribute t(block) onto p</a:t>
+              <a:t> distribute </a:t>
+            </a:r>
+            <a:r>
+              <a:rPr lang="en-US" altLang="ja-JP" sz="1200" dirty="0" smtClean="0">
+                <a:solidFill>
+                  <a:srgbClr val="FF0000"/>
+                </a:solidFill>
+                <a:latin typeface="Consolas" panose="020B0609020204030204" pitchFamily="49" charset="0"/>
+                <a:ea typeface="ＭＳ Ｐゴシック" panose="020B0600070205080204" pitchFamily="50" charset="-128"/>
+                <a:cs typeface="Consolas" panose="020B0609020204030204" pitchFamily="49" charset="0"/>
+                <a:sym typeface="Arial" panose="020B0604020202020204" pitchFamily="34" charset="0"/>
+              </a:rPr>
+              <a:t>t[block</a:t>
+            </a:r>
+            <a:r>
+              <a:rPr lang="en-US" altLang="ja-JP" sz="1200" dirty="0">
+                <a:solidFill>
+                  <a:srgbClr val="FF0000"/>
+                </a:solidFill>
+                <a:latin typeface="Consolas" panose="020B0609020204030204" pitchFamily="49" charset="0"/>
+                <a:ea typeface="ＭＳ Ｐゴシック" panose="020B0600070205080204" pitchFamily="50" charset="-128"/>
+                <a:cs typeface="Consolas" panose="020B0609020204030204" pitchFamily="49" charset="0"/>
+                <a:sym typeface="Arial" panose="020B0604020202020204" pitchFamily="34" charset="0"/>
+              </a:rPr>
+              <a:t>]</a:t>
+            </a:r>
+            <a:r>
+              <a:rPr lang="en-US" altLang="ja-JP" sz="1200" dirty="0" smtClean="0">
+                <a:solidFill>
+                  <a:srgbClr val="FF0000"/>
+                </a:solidFill>
+                <a:latin typeface="Consolas" panose="020B0609020204030204" pitchFamily="49" charset="0"/>
+                <a:ea typeface="ＭＳ Ｐゴシック" panose="020B0600070205080204" pitchFamily="50" charset="-128"/>
+                <a:cs typeface="Consolas" panose="020B0609020204030204" pitchFamily="49" charset="0"/>
+                <a:sym typeface="Arial" panose="020B0604020202020204" pitchFamily="34" charset="0"/>
+              </a:rPr>
+              <a:t> </a:t>
+            </a:r>
+            <a:r>
+              <a:rPr lang="en-US" altLang="ja-JP" sz="1200" dirty="0">
+                <a:solidFill>
+                  <a:srgbClr val="FF0000"/>
+                </a:solidFill>
+                <a:latin typeface="Consolas" panose="020B0609020204030204" pitchFamily="49" charset="0"/>
+                <a:ea typeface="ＭＳ Ｐゴシック" panose="020B0600070205080204" pitchFamily="50" charset="-128"/>
+                <a:cs typeface="Consolas" panose="020B0609020204030204" pitchFamily="49" charset="0"/>
+                <a:sym typeface="Arial" panose="020B0604020202020204" pitchFamily="34" charset="0"/>
+              </a:rPr>
+              <a:t>onto p</a:t>
             </a:r>
           </a:p>
           <a:p>
@@ -42824,10 +43205,10 @@
                 <a:cs typeface="Consolas" panose="020B0609020204030204" pitchFamily="49" charset="0"/>
                 <a:sym typeface="Arial" panose="020B0604020202020204" pitchFamily="34" charset="0"/>
               </a:rPr>
-              <a:t>] with t(</a:t>
-            </a:r>
-            <a:r>
-              <a:rPr lang="en-US" altLang="ja-JP" sz="1200" dirty="0" err="1">
+              <a:t>] with </a:t>
+            </a:r>
+            <a:r>
+              <a:rPr lang="en-US" altLang="ja-JP" sz="1200" dirty="0" smtClean="0">
                 <a:solidFill>
                   <a:srgbClr val="FF0000"/>
                 </a:solidFill>
@@ -42836,6 +43217,18 @@
                 <a:cs typeface="Consolas" panose="020B0609020204030204" pitchFamily="49" charset="0"/>
                 <a:sym typeface="Arial" panose="020B0604020202020204" pitchFamily="34" charset="0"/>
               </a:rPr>
+              <a:t>t[</a:t>
+            </a:r>
+            <a:r>
+              <a:rPr lang="en-US" altLang="ja-JP" sz="1200" dirty="0" err="1" smtClean="0">
+                <a:solidFill>
+                  <a:srgbClr val="FF0000"/>
+                </a:solidFill>
+                <a:latin typeface="Consolas" panose="020B0609020204030204" pitchFamily="49" charset="0"/>
+                <a:ea typeface="ＭＳ Ｐゴシック" panose="020B0600070205080204" pitchFamily="50" charset="-128"/>
+                <a:cs typeface="Consolas" panose="020B0609020204030204" pitchFamily="49" charset="0"/>
+                <a:sym typeface="Arial" panose="020B0604020202020204" pitchFamily="34" charset="0"/>
+              </a:rPr>
               <a:t>i</a:t>
             </a:r>
             <a:r>
@@ -42848,7 +43241,7 @@
                 <a:cs typeface="Consolas" panose="020B0609020204030204" pitchFamily="49" charset="0"/>
                 <a:sym typeface="Arial" panose="020B0604020202020204" pitchFamily="34" charset="0"/>
               </a:rPr>
-              <a:t>)</a:t>
+              <a:t>]</a:t>
             </a:r>
           </a:p>
           <a:p>
@@ -42920,10 +43313,10 @@
                 <a:cs typeface="Consolas" panose="020B0609020204030204" pitchFamily="49" charset="0"/>
                 <a:sym typeface="Arial" panose="020B0604020202020204" pitchFamily="34" charset="0"/>
               </a:rPr>
-              <a:t> loop on t(</a:t>
-            </a:r>
-            <a:r>
-              <a:rPr lang="en-US" altLang="ja-JP" sz="1200" dirty="0" err="1">
+              <a:t> loop on </a:t>
+            </a:r>
+            <a:r>
+              <a:rPr lang="en-US" altLang="ja-JP" sz="1200" dirty="0" smtClean="0">
                 <a:solidFill>
                   <a:srgbClr val="FF0000"/>
                 </a:solidFill>
@@ -42932,6 +43325,18 @@
                 <a:cs typeface="Consolas" panose="020B0609020204030204" pitchFamily="49" charset="0"/>
                 <a:sym typeface="Arial" panose="020B0604020202020204" pitchFamily="34" charset="0"/>
               </a:rPr>
+              <a:t>t[</a:t>
+            </a:r>
+            <a:r>
+              <a:rPr lang="en-US" altLang="ja-JP" sz="1200" dirty="0" err="1" smtClean="0">
+                <a:solidFill>
+                  <a:srgbClr val="FF0000"/>
+                </a:solidFill>
+                <a:latin typeface="Consolas" panose="020B0609020204030204" pitchFamily="49" charset="0"/>
+                <a:ea typeface="ＭＳ Ｐゴシック" panose="020B0600070205080204" pitchFamily="50" charset="-128"/>
+                <a:cs typeface="Consolas" panose="020B0609020204030204" pitchFamily="49" charset="0"/>
+                <a:sym typeface="Arial" panose="020B0604020202020204" pitchFamily="34" charset="0"/>
+              </a:rPr>
               <a:t>i</a:t>
             </a:r>
             <a:r>
@@ -42944,7 +43349,31 @@
                 <a:cs typeface="Consolas" panose="020B0609020204030204" pitchFamily="49" charset="0"/>
                 <a:sym typeface="Arial" panose="020B0604020202020204" pitchFamily="34" charset="0"/>
               </a:rPr>
-              <a:t>) reduction(+:res)</a:t>
+              <a:t>]</a:t>
+            </a:r>
+            <a:r>
+              <a:rPr lang="en-US" altLang="ja-JP" sz="1200" dirty="0" smtClean="0">
+                <a:solidFill>
+                  <a:srgbClr val="FF0000"/>
+                </a:solidFill>
+                <a:latin typeface="Consolas" panose="020B0609020204030204" pitchFamily="49" charset="0"/>
+                <a:ea typeface="ＭＳ Ｐゴシック" panose="020B0600070205080204" pitchFamily="50" charset="-128"/>
+                <a:cs typeface="Consolas" panose="020B0609020204030204" pitchFamily="49" charset="0"/>
+                <a:sym typeface="Arial" panose="020B0604020202020204" pitchFamily="34" charset="0"/>
+              </a:rPr>
+              <a:t> </a:t>
+            </a:r>
+            <a:r>
+              <a:rPr lang="en-US" altLang="ja-JP" sz="1200" dirty="0">
+                <a:solidFill>
+                  <a:srgbClr val="FF0000"/>
+                </a:solidFill>
+                <a:latin typeface="Consolas" panose="020B0609020204030204" pitchFamily="49" charset="0"/>
+                <a:ea typeface="ＭＳ Ｐゴシック" panose="020B0600070205080204" pitchFamily="50" charset="-128"/>
+                <a:cs typeface="Consolas" panose="020B0609020204030204" pitchFamily="49" charset="0"/>
+                <a:sym typeface="Arial" panose="020B0604020202020204" pitchFamily="34" charset="0"/>
+              </a:rPr>
+              <a:t>reduction(+:res)</a:t>
             </a:r>
           </a:p>
           <a:p>

</xml_diff>